<commit_message>
Code at the end of Tuesday's lecture
</commit_message>
<xml_diff>
--- a/Day to Day/W05-6 (February 16+18)/W06_Functions_Methods_passing_returning.pptx
+++ b/Day to Day/W05-6 (February 16+18)/W06_Functions_Methods_passing_returning.pptx
@@ -5,10 +5,16 @@
     <p:sldMasterId id="2147483672" r:id="rId1"/>
   </p:sldMasterIdLst>
   <p:notesMasterIdLst>
-    <p:notesMasterId r:id="rId3"/>
+    <p:notesMasterId r:id="rId9"/>
   </p:notesMasterIdLst>
   <p:sldIdLst>
     <p:sldId id="257" r:id="rId2"/>
+    <p:sldId id="258" r:id="rId3"/>
+    <p:sldId id="259" r:id="rId4"/>
+    <p:sldId id="260" r:id="rId5"/>
+    <p:sldId id="263" r:id="rId6"/>
+    <p:sldId id="261" r:id="rId7"/>
+    <p:sldId id="262" r:id="rId8"/>
   </p:sldIdLst>
   <p:sldSz cx="12192000" cy="6858000"/>
   <p:notesSz cx="6858000" cy="9144000"/>
@@ -109,7 +115,7 @@
   </p:defaultTextStyle>
   <p:extLst>
     <p:ext uri="{EFAFB233-063F-42B5-8137-9DF3F51BA10A}">
-      <p15:sldGuideLst xmlns:p15="http://schemas.microsoft.com/office/powerpoint/2012/main" xmlns="">
+      <p15:sldGuideLst xmlns:p15="http://schemas.microsoft.com/office/powerpoint/2012/main">
         <p15:guide id="1" orient="horz" pos="2160">
           <p15:clr>
             <a:srgbClr val="A4A3A4"/>
@@ -131,7 +137,7 @@
   <p:cmAuthor id="1" name="Mfeeney" initials="M" lastIdx="1" clrIdx="0">
     <p:extLst>
       <p:ext uri="{19B8F6BF-5375-455C-9EA6-DF929625EA0E}">
-        <p15:presenceInfo xmlns:p15="http://schemas.microsoft.com/office/powerpoint/2012/main" xmlns="" userId="Mfeeney" providerId="None"/>
+        <p15:presenceInfo xmlns:p15="http://schemas.microsoft.com/office/powerpoint/2012/main" userId="Mfeeney" providerId="None"/>
       </p:ext>
     </p:extLst>
   </p:cmAuthor>
@@ -670,7 +676,7 @@
     </p:spTree>
     <p:extLst>
       <p:ext uri="{BB962C8B-B14F-4D97-AF65-F5344CB8AC3E}">
-        <p14:creationId xmlns:p14="http://schemas.microsoft.com/office/powerpoint/2010/main" xmlns="" val="3107681668"/>
+        <p14:creationId xmlns:p14="http://schemas.microsoft.com/office/powerpoint/2010/main" val="3107681668"/>
       </p:ext>
     </p:extLst>
   </p:cSld>
@@ -842,7 +848,7 @@
     </p:spTree>
     <p:extLst>
       <p:ext uri="{BB962C8B-B14F-4D97-AF65-F5344CB8AC3E}">
-        <p14:creationId xmlns:p14="http://schemas.microsoft.com/office/powerpoint/2010/main" xmlns="" val="3647384181"/>
+        <p14:creationId xmlns:p14="http://schemas.microsoft.com/office/powerpoint/2010/main" val="3647384181"/>
       </p:ext>
     </p:extLst>
   </p:cSld>
@@ -1024,7 +1030,7 @@
     </p:spTree>
     <p:extLst>
       <p:ext uri="{BB962C8B-B14F-4D97-AF65-F5344CB8AC3E}">
-        <p14:creationId xmlns:p14="http://schemas.microsoft.com/office/powerpoint/2010/main" xmlns="" val="2792830750"/>
+        <p14:creationId xmlns:p14="http://schemas.microsoft.com/office/powerpoint/2010/main" val="2792830750"/>
       </p:ext>
     </p:extLst>
   </p:cSld>
@@ -1196,7 +1202,7 @@
     </p:spTree>
     <p:extLst>
       <p:ext uri="{BB962C8B-B14F-4D97-AF65-F5344CB8AC3E}">
-        <p14:creationId xmlns:p14="http://schemas.microsoft.com/office/powerpoint/2010/main" xmlns="" val="509184664"/>
+        <p14:creationId xmlns:p14="http://schemas.microsoft.com/office/powerpoint/2010/main" val="509184664"/>
       </p:ext>
     </p:extLst>
   </p:cSld>
@@ -1444,7 +1450,7 @@
     </p:spTree>
     <p:extLst>
       <p:ext uri="{BB962C8B-B14F-4D97-AF65-F5344CB8AC3E}">
-        <p14:creationId xmlns:p14="http://schemas.microsoft.com/office/powerpoint/2010/main" xmlns="" val="892156260"/>
+        <p14:creationId xmlns:p14="http://schemas.microsoft.com/office/powerpoint/2010/main" val="892156260"/>
       </p:ext>
     </p:extLst>
   </p:cSld>
@@ -1678,7 +1684,7 @@
     </p:spTree>
     <p:extLst>
       <p:ext uri="{BB962C8B-B14F-4D97-AF65-F5344CB8AC3E}">
-        <p14:creationId xmlns:p14="http://schemas.microsoft.com/office/powerpoint/2010/main" xmlns="" val="848249251"/>
+        <p14:creationId xmlns:p14="http://schemas.microsoft.com/office/powerpoint/2010/main" val="848249251"/>
       </p:ext>
     </p:extLst>
   </p:cSld>
@@ -2047,7 +2053,7 @@
     </p:spTree>
     <p:extLst>
       <p:ext uri="{BB962C8B-B14F-4D97-AF65-F5344CB8AC3E}">
-        <p14:creationId xmlns:p14="http://schemas.microsoft.com/office/powerpoint/2010/main" xmlns="" val="723057487"/>
+        <p14:creationId xmlns:p14="http://schemas.microsoft.com/office/powerpoint/2010/main" val="723057487"/>
       </p:ext>
     </p:extLst>
   </p:cSld>
@@ -2167,7 +2173,7 @@
     </p:spTree>
     <p:extLst>
       <p:ext uri="{BB962C8B-B14F-4D97-AF65-F5344CB8AC3E}">
-        <p14:creationId xmlns:p14="http://schemas.microsoft.com/office/powerpoint/2010/main" xmlns="" val="958946590"/>
+        <p14:creationId xmlns:p14="http://schemas.microsoft.com/office/powerpoint/2010/main" val="958946590"/>
       </p:ext>
     </p:extLst>
   </p:cSld>
@@ -2264,7 +2270,7 @@
     </p:spTree>
     <p:extLst>
       <p:ext uri="{BB962C8B-B14F-4D97-AF65-F5344CB8AC3E}">
-        <p14:creationId xmlns:p14="http://schemas.microsoft.com/office/powerpoint/2010/main" xmlns="" val="3845104630"/>
+        <p14:creationId xmlns:p14="http://schemas.microsoft.com/office/powerpoint/2010/main" val="3845104630"/>
       </p:ext>
     </p:extLst>
   </p:cSld>
@@ -2543,7 +2549,7 @@
     </p:spTree>
     <p:extLst>
       <p:ext uri="{BB962C8B-B14F-4D97-AF65-F5344CB8AC3E}">
-        <p14:creationId xmlns:p14="http://schemas.microsoft.com/office/powerpoint/2010/main" xmlns="" val="2714987254"/>
+        <p14:creationId xmlns:p14="http://schemas.microsoft.com/office/powerpoint/2010/main" val="2714987254"/>
       </p:ext>
     </p:extLst>
   </p:cSld>
@@ -2802,7 +2808,7 @@
     </p:spTree>
     <p:extLst>
       <p:ext uri="{BB962C8B-B14F-4D97-AF65-F5344CB8AC3E}">
-        <p14:creationId xmlns:p14="http://schemas.microsoft.com/office/powerpoint/2010/main" xmlns="" val="3689369377"/>
+        <p14:creationId xmlns:p14="http://schemas.microsoft.com/office/powerpoint/2010/main" val="3689369377"/>
       </p:ext>
     </p:extLst>
   </p:cSld>
@@ -3053,7 +3059,7 @@
     </p:spTree>
     <p:extLst>
       <p:ext uri="{BB962C8B-B14F-4D97-AF65-F5344CB8AC3E}">
-        <p14:creationId xmlns:p14="http://schemas.microsoft.com/office/powerpoint/2010/main" xmlns="" val="1205886065"/>
+        <p14:creationId xmlns:p14="http://schemas.microsoft.com/office/powerpoint/2010/main" val="1205886065"/>
       </p:ext>
     </p:extLst>
   </p:cSld>
@@ -3376,7 +3382,7 @@
           <p:cNvPr id="2" name="Title 1">
             <a:extLst>
               <a:ext uri="{FF2B5EF4-FFF2-40B4-BE49-F238E27FC236}">
-                <a16:creationId xmlns:a16="http://schemas.microsoft.com/office/drawing/2014/main" xmlns="" id="{BE2B12DA-F42D-461B-B185-057296D98A88}"/>
+                <a16:creationId xmlns:a16="http://schemas.microsoft.com/office/drawing/2014/main" id="{BE2B12DA-F42D-461B-B185-057296D98A88}"/>
               </a:ext>
             </a:extLst>
           </p:cNvPr>
@@ -3399,11 +3405,7 @@
           <a:p>
             <a:r>
               <a:rPr lang="en-US" dirty="0"/>
-              <a:t>Week </a:t>
-            </a:r>
-            <a:r>
-              <a:rPr lang="en-US" dirty="0" smtClean="0"/>
-              <a:t>5 &amp; 6</a:t>
+              <a:t>Week 5 &amp; 6</a:t>
             </a:r>
             <a:endParaRPr lang="en-CA" dirty="0"/>
           </a:p>
@@ -3414,7 +3416,7 @@
           <p:cNvPr id="3" name="Subtitle 2">
             <a:extLst>
               <a:ext uri="{FF2B5EF4-FFF2-40B4-BE49-F238E27FC236}">
-                <a16:creationId xmlns:a16="http://schemas.microsoft.com/office/drawing/2014/main" xmlns="" id="{563783FE-1566-47A5-9E9E-00D7902C6571}"/>
+                <a16:creationId xmlns:a16="http://schemas.microsoft.com/office/drawing/2014/main" id="{563783FE-1566-47A5-9E9E-00D7902C6571}"/>
               </a:ext>
             </a:extLst>
           </p:cNvPr>
@@ -3439,7 +3441,7 @@
           <a:p>
             <a:pPr algn="l"/>
             <a:r>
-              <a:rPr lang="en-CA" sz="5600" dirty="0" smtClean="0"/>
+              <a:rPr lang="en-CA" sz="5600" dirty="0"/>
               <a:t>What’s really happening when you use functions &amp; methods.</a:t>
             </a:r>
           </a:p>
@@ -3449,7 +3451,7 @@
               <a:buChar char="•"/>
             </a:pPr>
             <a:r>
-              <a:rPr lang="en-CA" sz="5600" dirty="0" smtClean="0"/>
+              <a:rPr lang="en-CA" sz="5600" dirty="0"/>
               <a:t> Stack &amp; Heap</a:t>
             </a:r>
           </a:p>
@@ -3459,12 +3461,8 @@
               <a:buChar char="•"/>
             </a:pPr>
             <a:r>
-              <a:rPr lang="en-CA" sz="5600" dirty="0" smtClean="0"/>
-              <a:t> </a:t>
-            </a:r>
-            <a:r>
-              <a:rPr lang="en-CA" sz="5600" dirty="0" smtClean="0"/>
-              <a:t>“by value” and “by reference”</a:t>
+              <a:rPr lang="en-CA" sz="5600" dirty="0"/>
+              <a:t> “by value” and “by reference”</a:t>
             </a:r>
           </a:p>
           <a:p>
@@ -3473,25 +3471,17 @@
               <a:buChar char="•"/>
             </a:pPr>
             <a:r>
-              <a:rPr lang="en-CA" sz="5600" dirty="0" smtClean="0"/>
-              <a:t> </a:t>
-            </a:r>
-            <a:r>
-              <a:rPr lang="en-CA" sz="5600" dirty="0" smtClean="0"/>
-              <a:t>“auto”: what it’s actually for</a:t>
-            </a:r>
-            <a:r>
-              <a:rPr lang="en-CA" sz="4400" dirty="0"/>
-              <a:t/>
+              <a:rPr lang="en-CA" sz="5600" dirty="0"/>
+              <a:t> “auto”: what it’s actually for</a:t>
             </a:r>
             <a:br>
               <a:rPr lang="en-CA" sz="4400" dirty="0"/>
             </a:br>
             <a:r>
-              <a:rPr lang="en-CA" sz="4400" dirty="0" smtClean="0"/>
+              <a:rPr lang="en-CA" sz="4400" dirty="0"/>
               <a:t>    (and why you should be careful with it)</a:t>
             </a:r>
-            <a:endParaRPr lang="en-CA" sz="5600" dirty="0" smtClean="0"/>
+            <a:endParaRPr lang="en-CA" sz="5600" dirty="0"/>
           </a:p>
         </p:txBody>
       </p:sp>
@@ -3558,7 +3548,7 @@
     </p:spTree>
     <p:extLst>
       <p:ext uri="{BB962C8B-B14F-4D97-AF65-F5344CB8AC3E}">
-        <p14:creationId xmlns:p14="http://schemas.microsoft.com/office/powerpoint/2010/main" xmlns="" val="1998408397"/>
+        <p14:creationId xmlns:p14="http://schemas.microsoft.com/office/powerpoint/2010/main" val="1998408397"/>
       </p:ext>
     </p:extLst>
   </p:cSld>
@@ -3566,6 +3556,3012 @@
     <a:masterClrMapping/>
   </p:clrMapOvr>
   <p:transition/>
+</p:sld>
+</file>
+
+<file path=ppt/slides/slide2.xml><?xml version="1.0" encoding="utf-8"?>
+<p:sld xmlns:a="http://schemas.openxmlformats.org/drawingml/2006/main" xmlns:r="http://schemas.openxmlformats.org/officeDocument/2006/relationships" xmlns:p="http://schemas.openxmlformats.org/presentationml/2006/main">
+  <p:cSld>
+    <p:spTree>
+      <p:nvGrpSpPr>
+        <p:cNvPr id="1" name=""/>
+        <p:cNvGrpSpPr/>
+        <p:nvPr/>
+      </p:nvGrpSpPr>
+      <p:grpSpPr>
+        <a:xfrm>
+          <a:off x="0" y="0"/>
+          <a:ext cx="0" cy="0"/>
+          <a:chOff x="0" y="0"/>
+          <a:chExt cx="0" cy="0"/>
+        </a:xfrm>
+      </p:grpSpPr>
+      <p:sp>
+        <p:nvSpPr>
+          <p:cNvPr id="2" name="Rectangle 1">
+            <a:extLst>
+              <a:ext uri="{FF2B5EF4-FFF2-40B4-BE49-F238E27FC236}">
+                <a16:creationId xmlns:a16="http://schemas.microsoft.com/office/drawing/2014/main" id="{E144D0AD-26F3-4D39-B24D-AF176C8729BF}"/>
+              </a:ext>
+            </a:extLst>
+          </p:cNvPr>
+          <p:cNvSpPr/>
+          <p:nvPr/>
+        </p:nvSpPr>
+        <p:spPr>
+          <a:xfrm>
+            <a:off x="200025" y="581025"/>
+            <a:ext cx="4391025" cy="5133975"/>
+          </a:xfrm>
+          <a:prstGeom prst="rect">
+            <a:avLst/>
+          </a:prstGeom>
+        </p:spPr>
+        <p:style>
+          <a:lnRef idx="2">
+            <a:schemeClr val="accent1">
+              <a:shade val="50000"/>
+            </a:schemeClr>
+          </a:lnRef>
+          <a:fillRef idx="1">
+            <a:schemeClr val="accent1"/>
+          </a:fillRef>
+          <a:effectRef idx="0">
+            <a:schemeClr val="accent1"/>
+          </a:effectRef>
+          <a:fontRef idx="minor">
+            <a:schemeClr val="lt1"/>
+          </a:fontRef>
+        </p:style>
+        <p:txBody>
+          <a:bodyPr rtlCol="0" anchor="ctr"/>
+          <a:lstStyle/>
+          <a:p>
+            <a:pPr algn="ctr"/>
+            <a:r>
+              <a:rPr lang="en-CA" dirty="0"/>
+              <a:t>172882: Main()</a:t>
+            </a:r>
+          </a:p>
+          <a:p>
+            <a:pPr algn="ctr"/>
+            <a:r>
+              <a:rPr lang="en-CA" dirty="0"/>
+              <a:t>172883: String name = “Michael”;</a:t>
+            </a:r>
+          </a:p>
+          <a:p>
+            <a:pPr algn="ctr"/>
+            <a:r>
+              <a:rPr lang="en-CA" sz="2400" b="1" dirty="0">
+                <a:solidFill>
+                  <a:srgbClr val="FF0000"/>
+                </a:solidFill>
+              </a:rPr>
+              <a:t>172884: Call </a:t>
+            </a:r>
+            <a:r>
+              <a:rPr lang="en-CA" sz="2400" b="1" dirty="0" err="1">
+                <a:solidFill>
+                  <a:srgbClr val="FF0000"/>
+                </a:solidFill>
+              </a:rPr>
+              <a:t>DoThis</a:t>
+            </a:r>
+            <a:r>
+              <a:rPr lang="en-CA" sz="2400" b="1" dirty="0">
+                <a:solidFill>
+                  <a:srgbClr val="FF0000"/>
+                </a:solidFill>
+              </a:rPr>
+              <a:t>()</a:t>
+            </a:r>
+          </a:p>
+          <a:p>
+            <a:pPr algn="ctr"/>
+            <a:endParaRPr lang="en-CA" dirty="0"/>
+          </a:p>
+          <a:p>
+            <a:pPr algn="ctr"/>
+            <a:endParaRPr lang="en-CA" dirty="0"/>
+          </a:p>
+          <a:p>
+            <a:pPr algn="ctr"/>
+            <a:r>
+              <a:rPr lang="en-CA" dirty="0"/>
+              <a:t>______________</a:t>
+            </a:r>
+          </a:p>
+          <a:p>
+            <a:pPr algn="ctr"/>
+            <a:r>
+              <a:rPr lang="en-CA" dirty="0"/>
+              <a:t>18372782: </a:t>
+            </a:r>
+            <a:r>
+              <a:rPr lang="en-CA" dirty="0" err="1"/>
+              <a:t>DoThis</a:t>
+            </a:r>
+            <a:r>
+              <a:rPr lang="en-CA" dirty="0"/>
+              <a:t>()</a:t>
+            </a:r>
+          </a:p>
+          <a:p>
+            <a:pPr algn="ctr"/>
+            <a:r>
+              <a:rPr lang="en-CA" dirty="0"/>
+              <a:t>18372783: </a:t>
+            </a:r>
+            <a:r>
+              <a:rPr lang="en-CA" dirty="0" err="1"/>
+              <a:t>Cout</a:t>
+            </a:r>
+            <a:r>
+              <a:rPr lang="en-CA" dirty="0"/>
+              <a:t> &lt;&lt; x</a:t>
+            </a:r>
+          </a:p>
+          <a:p>
+            <a:pPr algn="ctr"/>
+            <a:r>
+              <a:rPr lang="en-CA" sz="3200" dirty="0"/>
+              <a:t>18372783: </a:t>
+            </a:r>
+            <a:r>
+              <a:rPr lang="en-CA" sz="3200" dirty="0">
+                <a:solidFill>
+                  <a:srgbClr val="FF0000"/>
+                </a:solidFill>
+              </a:rPr>
+              <a:t>Return;</a:t>
+            </a:r>
+          </a:p>
+          <a:p>
+            <a:pPr algn="ctr"/>
+            <a:r>
+              <a:rPr lang="en-US" sz="3200" dirty="0">
+                <a:solidFill>
+                  <a:srgbClr val="FF0000"/>
+                </a:solidFill>
+              </a:rPr>
+              <a:t>______________</a:t>
+            </a:r>
+          </a:p>
+          <a:p>
+            <a:pPr algn="ctr"/>
+            <a:r>
+              <a:rPr lang="en-US" dirty="0"/>
+              <a:t>48978798: </a:t>
+            </a:r>
+            <a:r>
+              <a:rPr lang="en-US" dirty="0" err="1"/>
+              <a:t>DoTerrible</a:t>
+            </a:r>
+            <a:r>
+              <a:rPr lang="en-US" dirty="0"/>
+              <a:t>()</a:t>
+            </a:r>
+          </a:p>
+          <a:p>
+            <a:pPr algn="ctr"/>
+            <a:r>
+              <a:rPr lang="en-US" dirty="0"/>
+              <a:t>48978799 : </a:t>
+            </a:r>
+            <a:r>
+              <a:rPr lang="en-US" dirty="0" err="1"/>
+              <a:t>Cout</a:t>
+            </a:r>
+            <a:r>
+              <a:rPr lang="en-US" dirty="0"/>
+              <a:t> &lt;&lt; x</a:t>
+            </a:r>
+          </a:p>
+          <a:p>
+            <a:pPr algn="ctr"/>
+            <a:r>
+              <a:rPr lang="en-US" dirty="0"/>
+              <a:t>18372783: Return</a:t>
+            </a:r>
+            <a:endParaRPr lang="en-CA" dirty="0"/>
+          </a:p>
+        </p:txBody>
+      </p:sp>
+      <p:sp>
+        <p:nvSpPr>
+          <p:cNvPr id="3" name="Arrow: Left 2">
+            <a:extLst>
+              <a:ext uri="{FF2B5EF4-FFF2-40B4-BE49-F238E27FC236}">
+                <a16:creationId xmlns:a16="http://schemas.microsoft.com/office/drawing/2014/main" id="{0E843B16-37ED-460E-A2ED-E9064FB8FDE9}"/>
+              </a:ext>
+            </a:extLst>
+          </p:cNvPr>
+          <p:cNvSpPr/>
+          <p:nvPr/>
+        </p:nvSpPr>
+        <p:spPr>
+          <a:xfrm>
+            <a:off x="4124325" y="1924049"/>
+            <a:ext cx="933450" cy="685800"/>
+          </a:xfrm>
+          <a:prstGeom prst="leftArrow">
+            <a:avLst/>
+          </a:prstGeom>
+          <a:solidFill>
+            <a:srgbClr val="7030A0"/>
+          </a:solidFill>
+        </p:spPr>
+        <p:style>
+          <a:lnRef idx="2">
+            <a:schemeClr val="accent1">
+              <a:shade val="50000"/>
+            </a:schemeClr>
+          </a:lnRef>
+          <a:fillRef idx="1">
+            <a:schemeClr val="accent1"/>
+          </a:fillRef>
+          <a:effectRef idx="0">
+            <a:schemeClr val="accent1"/>
+          </a:effectRef>
+          <a:fontRef idx="minor">
+            <a:schemeClr val="lt1"/>
+          </a:fontRef>
+        </p:style>
+        <p:txBody>
+          <a:bodyPr rtlCol="0" anchor="ctr"/>
+          <a:lstStyle/>
+          <a:p>
+            <a:pPr algn="ctr"/>
+            <a:endParaRPr lang="en-CA"/>
+          </a:p>
+        </p:txBody>
+      </p:sp>
+      <p:sp>
+        <p:nvSpPr>
+          <p:cNvPr id="4" name="Rectangle 3">
+            <a:extLst>
+              <a:ext uri="{FF2B5EF4-FFF2-40B4-BE49-F238E27FC236}">
+                <a16:creationId xmlns:a16="http://schemas.microsoft.com/office/drawing/2014/main" id="{1DF80E6F-64D3-4D16-ABAC-5F5D8923B8D2}"/>
+              </a:ext>
+            </a:extLst>
+          </p:cNvPr>
+          <p:cNvSpPr/>
+          <p:nvPr/>
+        </p:nvSpPr>
+        <p:spPr>
+          <a:xfrm>
+            <a:off x="6210299" y="519112"/>
+            <a:ext cx="5572125" cy="5257800"/>
+          </a:xfrm>
+          <a:prstGeom prst="rect">
+            <a:avLst/>
+          </a:prstGeom>
+        </p:spPr>
+        <p:style>
+          <a:lnRef idx="2">
+            <a:schemeClr val="accent1">
+              <a:shade val="50000"/>
+            </a:schemeClr>
+          </a:lnRef>
+          <a:fillRef idx="1">
+            <a:schemeClr val="accent1"/>
+          </a:fillRef>
+          <a:effectRef idx="0">
+            <a:schemeClr val="accent1"/>
+          </a:effectRef>
+          <a:fontRef idx="minor">
+            <a:schemeClr val="lt1"/>
+          </a:fontRef>
+        </p:style>
+        <p:txBody>
+          <a:bodyPr rtlCol="0" anchor="ctr"/>
+          <a:lstStyle/>
+          <a:p>
+            <a:pPr algn="ctr"/>
+            <a:r>
+              <a:rPr lang="en-CA" sz="3200" dirty="0"/>
+              <a:t>Stack:</a:t>
+            </a:r>
+          </a:p>
+          <a:p>
+            <a:pPr algn="ctr"/>
+            <a:r>
+              <a:rPr lang="en-CA" sz="3200" dirty="0"/>
+              <a:t>std::string = “</a:t>
+            </a:r>
+            <a:r>
+              <a:rPr lang="en-CA" sz="3200" dirty="0" err="1"/>
+              <a:t>michael</a:t>
+            </a:r>
+            <a:r>
+              <a:rPr lang="en-CA" sz="3200" dirty="0"/>
+              <a:t>”</a:t>
+            </a:r>
+          </a:p>
+          <a:p>
+            <a:pPr algn="ctr"/>
+            <a:r>
+              <a:rPr lang="en-CA" sz="3200" dirty="0"/>
+              <a:t>Return address (</a:t>
+            </a:r>
+            <a:r>
+              <a:rPr lang="en-US" sz="3200" dirty="0"/>
+              <a:t>48978798</a:t>
+            </a:r>
+            <a:r>
+              <a:rPr lang="en-CA" sz="3200" dirty="0"/>
+              <a:t>)</a:t>
+            </a:r>
+          </a:p>
+          <a:p>
+            <a:pPr algn="ctr"/>
+            <a:endParaRPr lang="en-CA" sz="3200" dirty="0"/>
+          </a:p>
+          <a:p>
+            <a:pPr algn="ctr"/>
+            <a:endParaRPr lang="en-CA" sz="3200" dirty="0"/>
+          </a:p>
+          <a:p>
+            <a:pPr algn="ctr"/>
+            <a:endParaRPr lang="en-CA" sz="3200" dirty="0"/>
+          </a:p>
+          <a:p>
+            <a:pPr algn="ctr"/>
+            <a:endParaRPr lang="en-CA" sz="3200" dirty="0"/>
+          </a:p>
+          <a:p>
+            <a:pPr algn="ctr"/>
+            <a:endParaRPr lang="en-CA" sz="3200" dirty="0"/>
+          </a:p>
+          <a:p>
+            <a:pPr algn="ctr"/>
+            <a:endParaRPr lang="en-CA" sz="3200" dirty="0"/>
+          </a:p>
+          <a:p>
+            <a:pPr algn="ctr"/>
+            <a:endParaRPr lang="en-CA" sz="3200" dirty="0"/>
+          </a:p>
+        </p:txBody>
+      </p:sp>
+      <p:sp>
+        <p:nvSpPr>
+          <p:cNvPr id="5" name="Arrow: Left 4">
+            <a:extLst>
+              <a:ext uri="{FF2B5EF4-FFF2-40B4-BE49-F238E27FC236}">
+                <a16:creationId xmlns:a16="http://schemas.microsoft.com/office/drawing/2014/main" id="{39232E8F-C7AD-4C86-81B6-ED31F3D809AC}"/>
+              </a:ext>
+            </a:extLst>
+          </p:cNvPr>
+          <p:cNvSpPr/>
+          <p:nvPr/>
+        </p:nvSpPr>
+        <p:spPr>
+          <a:xfrm rot="10800000">
+            <a:off x="5629275" y="1609725"/>
+            <a:ext cx="933450" cy="685800"/>
+          </a:xfrm>
+          <a:prstGeom prst="leftArrow">
+            <a:avLst/>
+          </a:prstGeom>
+          <a:solidFill>
+            <a:srgbClr val="7030A0"/>
+          </a:solidFill>
+        </p:spPr>
+        <p:style>
+          <a:lnRef idx="2">
+            <a:schemeClr val="accent1">
+              <a:shade val="50000"/>
+            </a:schemeClr>
+          </a:lnRef>
+          <a:fillRef idx="1">
+            <a:schemeClr val="accent1"/>
+          </a:fillRef>
+          <a:effectRef idx="0">
+            <a:schemeClr val="accent1"/>
+          </a:effectRef>
+          <a:fontRef idx="minor">
+            <a:schemeClr val="lt1"/>
+          </a:fontRef>
+        </p:style>
+        <p:txBody>
+          <a:bodyPr rtlCol="0" anchor="ctr"/>
+          <a:lstStyle/>
+          <a:p>
+            <a:pPr algn="ctr"/>
+            <a:endParaRPr lang="en-CA"/>
+          </a:p>
+        </p:txBody>
+      </p:sp>
+    </p:spTree>
+    <p:extLst>
+      <p:ext uri="{BB962C8B-B14F-4D97-AF65-F5344CB8AC3E}">
+        <p14:creationId xmlns:p14="http://schemas.microsoft.com/office/powerpoint/2010/main" val="3559397406"/>
+      </p:ext>
+    </p:extLst>
+  </p:cSld>
+  <p:clrMapOvr>
+    <a:masterClrMapping/>
+  </p:clrMapOvr>
+</p:sld>
+</file>
+
+<file path=ppt/slides/slide3.xml><?xml version="1.0" encoding="utf-8"?>
+<p:sld xmlns:a="http://schemas.openxmlformats.org/drawingml/2006/main" xmlns:r="http://schemas.openxmlformats.org/officeDocument/2006/relationships" xmlns:p="http://schemas.openxmlformats.org/presentationml/2006/main">
+  <p:cSld>
+    <p:spTree>
+      <p:nvGrpSpPr>
+        <p:cNvPr id="1" name=""/>
+        <p:cNvGrpSpPr/>
+        <p:nvPr/>
+      </p:nvGrpSpPr>
+      <p:grpSpPr>
+        <a:xfrm>
+          <a:off x="0" y="0"/>
+          <a:ext cx="0" cy="0"/>
+          <a:chOff x="0" y="0"/>
+          <a:chExt cx="0" cy="0"/>
+        </a:xfrm>
+      </p:grpSpPr>
+      <p:sp>
+        <p:nvSpPr>
+          <p:cNvPr id="2" name="Rectangle 1">
+            <a:extLst>
+              <a:ext uri="{FF2B5EF4-FFF2-40B4-BE49-F238E27FC236}">
+                <a16:creationId xmlns:a16="http://schemas.microsoft.com/office/drawing/2014/main" id="{E144D0AD-26F3-4D39-B24D-AF176C8729BF}"/>
+              </a:ext>
+            </a:extLst>
+          </p:cNvPr>
+          <p:cNvSpPr/>
+          <p:nvPr/>
+        </p:nvSpPr>
+        <p:spPr>
+          <a:xfrm>
+            <a:off x="200025" y="581025"/>
+            <a:ext cx="4391025" cy="5133975"/>
+          </a:xfrm>
+          <a:prstGeom prst="rect">
+            <a:avLst/>
+          </a:prstGeom>
+        </p:spPr>
+        <p:style>
+          <a:lnRef idx="2">
+            <a:schemeClr val="accent1">
+              <a:shade val="50000"/>
+            </a:schemeClr>
+          </a:lnRef>
+          <a:fillRef idx="1">
+            <a:schemeClr val="accent1"/>
+          </a:fillRef>
+          <a:effectRef idx="0">
+            <a:schemeClr val="accent1"/>
+          </a:effectRef>
+          <a:fontRef idx="minor">
+            <a:schemeClr val="lt1"/>
+          </a:fontRef>
+        </p:style>
+        <p:txBody>
+          <a:bodyPr rtlCol="0" anchor="ctr"/>
+          <a:lstStyle/>
+          <a:p>
+            <a:pPr algn="ctr"/>
+            <a:r>
+              <a:rPr lang="en-CA" dirty="0"/>
+              <a:t>172882: Main()</a:t>
+            </a:r>
+          </a:p>
+          <a:p>
+            <a:pPr algn="ctr"/>
+            <a:r>
+              <a:rPr lang="en-CA" dirty="0"/>
+              <a:t>172883: String name = “Michael”;</a:t>
+            </a:r>
+          </a:p>
+          <a:p>
+            <a:pPr algn="ctr"/>
+            <a:r>
+              <a:rPr lang="en-CA" sz="2400" b="1" dirty="0">
+                <a:solidFill>
+                  <a:srgbClr val="FF0000"/>
+                </a:solidFill>
+              </a:rPr>
+              <a:t>172884: Call </a:t>
+            </a:r>
+            <a:r>
+              <a:rPr lang="en-CA" sz="2400" b="1" dirty="0" err="1">
+                <a:solidFill>
+                  <a:srgbClr val="FF0000"/>
+                </a:solidFill>
+              </a:rPr>
+              <a:t>DoThis</a:t>
+            </a:r>
+            <a:r>
+              <a:rPr lang="en-CA" sz="2400" b="1" dirty="0">
+                <a:solidFill>
+                  <a:srgbClr val="FF0000"/>
+                </a:solidFill>
+              </a:rPr>
+              <a:t>()</a:t>
+            </a:r>
+          </a:p>
+          <a:p>
+            <a:pPr algn="ctr"/>
+            <a:endParaRPr lang="en-CA" dirty="0"/>
+          </a:p>
+          <a:p>
+            <a:pPr algn="ctr"/>
+            <a:endParaRPr lang="en-CA" dirty="0"/>
+          </a:p>
+          <a:p>
+            <a:pPr algn="ctr"/>
+            <a:r>
+              <a:rPr lang="en-CA" dirty="0"/>
+              <a:t>______________</a:t>
+            </a:r>
+          </a:p>
+          <a:p>
+            <a:pPr algn="ctr"/>
+            <a:r>
+              <a:rPr lang="en-CA" dirty="0"/>
+              <a:t>18372782: </a:t>
+            </a:r>
+            <a:r>
+              <a:rPr lang="en-CA" dirty="0" err="1"/>
+              <a:t>DoThis</a:t>
+            </a:r>
+            <a:r>
+              <a:rPr lang="en-CA" dirty="0"/>
+              <a:t>()</a:t>
+            </a:r>
+          </a:p>
+          <a:p>
+            <a:pPr algn="ctr"/>
+            <a:r>
+              <a:rPr lang="en-CA" dirty="0"/>
+              <a:t>18372783: </a:t>
+            </a:r>
+            <a:r>
+              <a:rPr lang="en-CA" dirty="0" err="1"/>
+              <a:t>Cout</a:t>
+            </a:r>
+            <a:r>
+              <a:rPr lang="en-CA" dirty="0"/>
+              <a:t> &lt;&lt; x</a:t>
+            </a:r>
+          </a:p>
+          <a:p>
+            <a:pPr algn="ctr"/>
+            <a:r>
+              <a:rPr lang="en-CA" sz="3200" dirty="0"/>
+              <a:t>18372783: </a:t>
+            </a:r>
+            <a:r>
+              <a:rPr lang="en-CA" sz="3200" dirty="0">
+                <a:solidFill>
+                  <a:srgbClr val="FF0000"/>
+                </a:solidFill>
+              </a:rPr>
+              <a:t>Return;</a:t>
+            </a:r>
+          </a:p>
+          <a:p>
+            <a:pPr algn="ctr"/>
+            <a:endParaRPr lang="en-CA" dirty="0"/>
+          </a:p>
+        </p:txBody>
+      </p:sp>
+      <p:sp>
+        <p:nvSpPr>
+          <p:cNvPr id="3" name="Arrow: Left 2">
+            <a:extLst>
+              <a:ext uri="{FF2B5EF4-FFF2-40B4-BE49-F238E27FC236}">
+                <a16:creationId xmlns:a16="http://schemas.microsoft.com/office/drawing/2014/main" id="{0E843B16-37ED-460E-A2ED-E9064FB8FDE9}"/>
+              </a:ext>
+            </a:extLst>
+          </p:cNvPr>
+          <p:cNvSpPr/>
+          <p:nvPr/>
+        </p:nvSpPr>
+        <p:spPr>
+          <a:xfrm>
+            <a:off x="4000499" y="2028823"/>
+            <a:ext cx="933450" cy="685800"/>
+          </a:xfrm>
+          <a:prstGeom prst="leftArrow">
+            <a:avLst/>
+          </a:prstGeom>
+          <a:solidFill>
+            <a:srgbClr val="7030A0"/>
+          </a:solidFill>
+        </p:spPr>
+        <p:style>
+          <a:lnRef idx="2">
+            <a:schemeClr val="accent1">
+              <a:shade val="50000"/>
+            </a:schemeClr>
+          </a:lnRef>
+          <a:fillRef idx="1">
+            <a:schemeClr val="accent1"/>
+          </a:fillRef>
+          <a:effectRef idx="0">
+            <a:schemeClr val="accent1"/>
+          </a:effectRef>
+          <a:fontRef idx="minor">
+            <a:schemeClr val="lt1"/>
+          </a:fontRef>
+        </p:style>
+        <p:txBody>
+          <a:bodyPr rtlCol="0" anchor="ctr"/>
+          <a:lstStyle/>
+          <a:p>
+            <a:pPr algn="ctr"/>
+            <a:endParaRPr lang="en-CA" dirty="0"/>
+          </a:p>
+        </p:txBody>
+      </p:sp>
+      <p:sp>
+        <p:nvSpPr>
+          <p:cNvPr id="4" name="Rectangle 3">
+            <a:extLst>
+              <a:ext uri="{FF2B5EF4-FFF2-40B4-BE49-F238E27FC236}">
+                <a16:creationId xmlns:a16="http://schemas.microsoft.com/office/drawing/2014/main" id="{1DF80E6F-64D3-4D16-ABAC-5F5D8923B8D2}"/>
+              </a:ext>
+            </a:extLst>
+          </p:cNvPr>
+          <p:cNvSpPr/>
+          <p:nvPr/>
+        </p:nvSpPr>
+        <p:spPr>
+          <a:xfrm>
+            <a:off x="6210299" y="519112"/>
+            <a:ext cx="5572125" cy="5257800"/>
+          </a:xfrm>
+          <a:prstGeom prst="rect">
+            <a:avLst/>
+          </a:prstGeom>
+        </p:spPr>
+        <p:style>
+          <a:lnRef idx="2">
+            <a:schemeClr val="accent1">
+              <a:shade val="50000"/>
+            </a:schemeClr>
+          </a:lnRef>
+          <a:fillRef idx="1">
+            <a:schemeClr val="accent1"/>
+          </a:fillRef>
+          <a:effectRef idx="0">
+            <a:schemeClr val="accent1"/>
+          </a:effectRef>
+          <a:fontRef idx="minor">
+            <a:schemeClr val="lt1"/>
+          </a:fontRef>
+        </p:style>
+        <p:txBody>
+          <a:bodyPr rtlCol="0" anchor="ctr"/>
+          <a:lstStyle/>
+          <a:p>
+            <a:pPr algn="ctr"/>
+            <a:r>
+              <a:rPr lang="en-CA" sz="3200" dirty="0"/>
+              <a:t>Stack:</a:t>
+            </a:r>
+          </a:p>
+          <a:p>
+            <a:pPr algn="ctr"/>
+            <a:r>
+              <a:rPr lang="en-CA" sz="3200" dirty="0"/>
+              <a:t>std::string = “</a:t>
+            </a:r>
+            <a:r>
+              <a:rPr lang="en-CA" sz="3200" dirty="0" err="1"/>
+              <a:t>michael</a:t>
+            </a:r>
+            <a:r>
+              <a:rPr lang="en-CA" sz="3200" dirty="0"/>
+              <a:t>”</a:t>
+            </a:r>
+          </a:p>
+          <a:p>
+            <a:pPr algn="ctr"/>
+            <a:r>
+              <a:rPr lang="en-CA" sz="3200" dirty="0"/>
+              <a:t>Int = 4</a:t>
+            </a:r>
+          </a:p>
+          <a:p>
+            <a:pPr algn="ctr"/>
+            <a:r>
+              <a:rPr lang="en-CA" sz="3200" dirty="0"/>
+              <a:t>Return address (</a:t>
+            </a:r>
+            <a:r>
+              <a:rPr lang="en-US" sz="3200" dirty="0"/>
+              <a:t>48978798</a:t>
+            </a:r>
+            <a:r>
+              <a:rPr lang="en-CA" sz="3200" dirty="0"/>
+              <a:t>)</a:t>
+            </a:r>
+          </a:p>
+          <a:p>
+            <a:pPr algn="ctr"/>
+            <a:endParaRPr lang="en-CA" sz="3200" dirty="0"/>
+          </a:p>
+          <a:p>
+            <a:pPr algn="ctr"/>
+            <a:endParaRPr lang="en-CA" sz="3200" dirty="0"/>
+          </a:p>
+          <a:p>
+            <a:pPr algn="ctr"/>
+            <a:endParaRPr lang="en-CA" sz="3200" dirty="0"/>
+          </a:p>
+          <a:p>
+            <a:pPr algn="ctr"/>
+            <a:endParaRPr lang="en-CA" sz="3200" dirty="0"/>
+          </a:p>
+          <a:p>
+            <a:pPr algn="ctr"/>
+            <a:endParaRPr lang="en-CA" sz="3200" dirty="0"/>
+          </a:p>
+          <a:p>
+            <a:pPr algn="ctr"/>
+            <a:endParaRPr lang="en-CA" sz="3200" dirty="0"/>
+          </a:p>
+          <a:p>
+            <a:pPr algn="ctr"/>
+            <a:endParaRPr lang="en-CA" sz="3200" dirty="0"/>
+          </a:p>
+        </p:txBody>
+      </p:sp>
+      <p:sp>
+        <p:nvSpPr>
+          <p:cNvPr id="5" name="Arrow: Left 4">
+            <a:extLst>
+              <a:ext uri="{FF2B5EF4-FFF2-40B4-BE49-F238E27FC236}">
+                <a16:creationId xmlns:a16="http://schemas.microsoft.com/office/drawing/2014/main" id="{39232E8F-C7AD-4C86-81B6-ED31F3D809AC}"/>
+              </a:ext>
+            </a:extLst>
+          </p:cNvPr>
+          <p:cNvSpPr/>
+          <p:nvPr/>
+        </p:nvSpPr>
+        <p:spPr>
+          <a:xfrm rot="10800000">
+            <a:off x="5629275" y="1609725"/>
+            <a:ext cx="933450" cy="685800"/>
+          </a:xfrm>
+          <a:prstGeom prst="leftArrow">
+            <a:avLst/>
+          </a:prstGeom>
+          <a:solidFill>
+            <a:srgbClr val="7030A0"/>
+          </a:solidFill>
+        </p:spPr>
+        <p:style>
+          <a:lnRef idx="2">
+            <a:schemeClr val="accent1">
+              <a:shade val="50000"/>
+            </a:schemeClr>
+          </a:lnRef>
+          <a:fillRef idx="1">
+            <a:schemeClr val="accent1"/>
+          </a:fillRef>
+          <a:effectRef idx="0">
+            <a:schemeClr val="accent1"/>
+          </a:effectRef>
+          <a:fontRef idx="minor">
+            <a:schemeClr val="lt1"/>
+          </a:fontRef>
+        </p:style>
+        <p:txBody>
+          <a:bodyPr rtlCol="0" anchor="ctr"/>
+          <a:lstStyle/>
+          <a:p>
+            <a:pPr algn="ctr"/>
+            <a:endParaRPr lang="en-CA"/>
+          </a:p>
+        </p:txBody>
+      </p:sp>
+    </p:spTree>
+    <p:extLst>
+      <p:ext uri="{BB962C8B-B14F-4D97-AF65-F5344CB8AC3E}">
+        <p14:creationId xmlns:p14="http://schemas.microsoft.com/office/powerpoint/2010/main" val="3734104974"/>
+      </p:ext>
+    </p:extLst>
+  </p:cSld>
+  <p:clrMapOvr>
+    <a:masterClrMapping/>
+  </p:clrMapOvr>
+</p:sld>
+</file>
+
+<file path=ppt/slides/slide4.xml><?xml version="1.0" encoding="utf-8"?>
+<p:sld xmlns:a="http://schemas.openxmlformats.org/drawingml/2006/main" xmlns:r="http://schemas.openxmlformats.org/officeDocument/2006/relationships" xmlns:p="http://schemas.openxmlformats.org/presentationml/2006/main">
+  <p:cSld>
+    <p:spTree>
+      <p:nvGrpSpPr>
+        <p:cNvPr id="1" name=""/>
+        <p:cNvGrpSpPr/>
+        <p:nvPr/>
+      </p:nvGrpSpPr>
+      <p:grpSpPr>
+        <a:xfrm>
+          <a:off x="0" y="0"/>
+          <a:ext cx="0" cy="0"/>
+          <a:chOff x="0" y="0"/>
+          <a:chExt cx="0" cy="0"/>
+        </a:xfrm>
+      </p:grpSpPr>
+      <p:sp>
+        <p:nvSpPr>
+          <p:cNvPr id="2" name="Rectangle 1">
+            <a:extLst>
+              <a:ext uri="{FF2B5EF4-FFF2-40B4-BE49-F238E27FC236}">
+                <a16:creationId xmlns:a16="http://schemas.microsoft.com/office/drawing/2014/main" id="{E144D0AD-26F3-4D39-B24D-AF176C8729BF}"/>
+              </a:ext>
+            </a:extLst>
+          </p:cNvPr>
+          <p:cNvSpPr/>
+          <p:nvPr/>
+        </p:nvSpPr>
+        <p:spPr>
+          <a:xfrm>
+            <a:off x="200025" y="581025"/>
+            <a:ext cx="4391025" cy="5133975"/>
+          </a:xfrm>
+          <a:prstGeom prst="rect">
+            <a:avLst/>
+          </a:prstGeom>
+        </p:spPr>
+        <p:style>
+          <a:lnRef idx="2">
+            <a:schemeClr val="accent1">
+              <a:shade val="50000"/>
+            </a:schemeClr>
+          </a:lnRef>
+          <a:fillRef idx="1">
+            <a:schemeClr val="accent1"/>
+          </a:fillRef>
+          <a:effectRef idx="0">
+            <a:schemeClr val="accent1"/>
+          </a:effectRef>
+          <a:fontRef idx="minor">
+            <a:schemeClr val="lt1"/>
+          </a:fontRef>
+        </p:style>
+        <p:txBody>
+          <a:bodyPr rtlCol="0" anchor="ctr"/>
+          <a:lstStyle/>
+          <a:p>
+            <a:pPr algn="ctr"/>
+            <a:r>
+              <a:rPr lang="en-CA" dirty="0"/>
+              <a:t>172882: Main()</a:t>
+            </a:r>
+          </a:p>
+          <a:p>
+            <a:pPr algn="ctr"/>
+            <a:r>
+              <a:rPr lang="en-CA" dirty="0"/>
+              <a:t>172883: String name = “Michael”;</a:t>
+            </a:r>
+          </a:p>
+          <a:p>
+            <a:pPr algn="ctr"/>
+            <a:r>
+              <a:rPr lang="en-CA" sz="2400" b="1" dirty="0">
+                <a:solidFill>
+                  <a:srgbClr val="FF0000"/>
+                </a:solidFill>
+              </a:rPr>
+              <a:t>172884: Call </a:t>
+            </a:r>
+            <a:r>
+              <a:rPr lang="en-CA" sz="2400" b="1" dirty="0" err="1">
+                <a:solidFill>
+                  <a:srgbClr val="FF0000"/>
+                </a:solidFill>
+              </a:rPr>
+              <a:t>DoThis</a:t>
+            </a:r>
+            <a:r>
+              <a:rPr lang="en-CA" sz="2400" b="1" dirty="0">
+                <a:solidFill>
+                  <a:srgbClr val="FF0000"/>
+                </a:solidFill>
+              </a:rPr>
+              <a:t>()</a:t>
+            </a:r>
+          </a:p>
+          <a:p>
+            <a:pPr algn="ctr"/>
+            <a:endParaRPr lang="en-CA" dirty="0"/>
+          </a:p>
+          <a:p>
+            <a:pPr algn="ctr"/>
+            <a:endParaRPr lang="en-CA" dirty="0"/>
+          </a:p>
+          <a:p>
+            <a:pPr algn="ctr"/>
+            <a:r>
+              <a:rPr lang="en-CA" dirty="0"/>
+              <a:t>______________</a:t>
+            </a:r>
+          </a:p>
+          <a:p>
+            <a:pPr algn="ctr"/>
+            <a:r>
+              <a:rPr lang="en-CA" dirty="0"/>
+              <a:t>18372782: </a:t>
+            </a:r>
+            <a:r>
+              <a:rPr lang="en-CA" dirty="0" err="1"/>
+              <a:t>DoThis</a:t>
+            </a:r>
+            <a:r>
+              <a:rPr lang="en-CA" dirty="0"/>
+              <a:t>()</a:t>
+            </a:r>
+          </a:p>
+          <a:p>
+            <a:pPr algn="ctr"/>
+            <a:r>
+              <a:rPr lang="en-CA" dirty="0"/>
+              <a:t>18372783: </a:t>
+            </a:r>
+            <a:r>
+              <a:rPr lang="en-CA" dirty="0" err="1"/>
+              <a:t>Cout</a:t>
+            </a:r>
+            <a:r>
+              <a:rPr lang="en-CA" dirty="0"/>
+              <a:t> &lt;&lt; x</a:t>
+            </a:r>
+          </a:p>
+          <a:p>
+            <a:pPr algn="ctr"/>
+            <a:r>
+              <a:rPr lang="en-CA" sz="3200" dirty="0"/>
+              <a:t>18372783: </a:t>
+            </a:r>
+            <a:r>
+              <a:rPr lang="en-CA" sz="3200" dirty="0">
+                <a:solidFill>
+                  <a:srgbClr val="FF0000"/>
+                </a:solidFill>
+              </a:rPr>
+              <a:t>Return;</a:t>
+            </a:r>
+          </a:p>
+          <a:p>
+            <a:pPr algn="ctr"/>
+            <a:endParaRPr lang="en-CA" dirty="0"/>
+          </a:p>
+        </p:txBody>
+      </p:sp>
+      <p:sp>
+        <p:nvSpPr>
+          <p:cNvPr id="3" name="Arrow: Left 2">
+            <a:extLst>
+              <a:ext uri="{FF2B5EF4-FFF2-40B4-BE49-F238E27FC236}">
+                <a16:creationId xmlns:a16="http://schemas.microsoft.com/office/drawing/2014/main" id="{0E843B16-37ED-460E-A2ED-E9064FB8FDE9}"/>
+              </a:ext>
+            </a:extLst>
+          </p:cNvPr>
+          <p:cNvSpPr/>
+          <p:nvPr/>
+        </p:nvSpPr>
+        <p:spPr>
+          <a:xfrm>
+            <a:off x="4000499" y="2028823"/>
+            <a:ext cx="933450" cy="685800"/>
+          </a:xfrm>
+          <a:prstGeom prst="leftArrow">
+            <a:avLst/>
+          </a:prstGeom>
+          <a:solidFill>
+            <a:srgbClr val="7030A0"/>
+          </a:solidFill>
+        </p:spPr>
+        <p:style>
+          <a:lnRef idx="2">
+            <a:schemeClr val="accent1">
+              <a:shade val="50000"/>
+            </a:schemeClr>
+          </a:lnRef>
+          <a:fillRef idx="1">
+            <a:schemeClr val="accent1"/>
+          </a:fillRef>
+          <a:effectRef idx="0">
+            <a:schemeClr val="accent1"/>
+          </a:effectRef>
+          <a:fontRef idx="minor">
+            <a:schemeClr val="lt1"/>
+          </a:fontRef>
+        </p:style>
+        <p:txBody>
+          <a:bodyPr rtlCol="0" anchor="ctr"/>
+          <a:lstStyle/>
+          <a:p>
+            <a:pPr algn="ctr"/>
+            <a:endParaRPr lang="en-CA" dirty="0"/>
+          </a:p>
+        </p:txBody>
+      </p:sp>
+      <p:sp>
+        <p:nvSpPr>
+          <p:cNvPr id="4" name="Rectangle 3">
+            <a:extLst>
+              <a:ext uri="{FF2B5EF4-FFF2-40B4-BE49-F238E27FC236}">
+                <a16:creationId xmlns:a16="http://schemas.microsoft.com/office/drawing/2014/main" id="{1DF80E6F-64D3-4D16-ABAC-5F5D8923B8D2}"/>
+              </a:ext>
+            </a:extLst>
+          </p:cNvPr>
+          <p:cNvSpPr/>
+          <p:nvPr/>
+        </p:nvSpPr>
+        <p:spPr>
+          <a:xfrm>
+            <a:off x="6210299" y="519112"/>
+            <a:ext cx="5572125" cy="5257800"/>
+          </a:xfrm>
+          <a:prstGeom prst="rect">
+            <a:avLst/>
+          </a:prstGeom>
+        </p:spPr>
+        <p:style>
+          <a:lnRef idx="2">
+            <a:schemeClr val="accent1">
+              <a:shade val="50000"/>
+            </a:schemeClr>
+          </a:lnRef>
+          <a:fillRef idx="1">
+            <a:schemeClr val="accent1"/>
+          </a:fillRef>
+          <a:effectRef idx="0">
+            <a:schemeClr val="accent1"/>
+          </a:effectRef>
+          <a:fontRef idx="minor">
+            <a:schemeClr val="lt1"/>
+          </a:fontRef>
+        </p:style>
+        <p:txBody>
+          <a:bodyPr rtlCol="0" anchor="ctr"/>
+          <a:lstStyle/>
+          <a:p>
+            <a:pPr algn="ctr"/>
+            <a:r>
+              <a:rPr lang="en-CA" sz="3200" dirty="0"/>
+              <a:t>Stack:</a:t>
+            </a:r>
+          </a:p>
+          <a:p>
+            <a:pPr algn="ctr"/>
+            <a:r>
+              <a:rPr lang="en-CA" sz="3200" dirty="0"/>
+              <a:t>std::string = “</a:t>
+            </a:r>
+            <a:r>
+              <a:rPr lang="en-CA" sz="3200" dirty="0" err="1"/>
+              <a:t>michael</a:t>
+            </a:r>
+            <a:r>
+              <a:rPr lang="en-CA" sz="3200" dirty="0"/>
+              <a:t>”</a:t>
+            </a:r>
+          </a:p>
+          <a:p>
+            <a:pPr algn="ctr"/>
+            <a:r>
+              <a:rPr lang="en-CA" sz="3200" dirty="0"/>
+              <a:t>Int = 4</a:t>
+            </a:r>
+          </a:p>
+          <a:p>
+            <a:pPr algn="ctr"/>
+            <a:r>
+              <a:rPr lang="en-CA" sz="3200" dirty="0"/>
+              <a:t>Return address (18372783)</a:t>
+            </a:r>
+          </a:p>
+          <a:p>
+            <a:pPr algn="ctr"/>
+            <a:endParaRPr lang="en-CA" sz="3200" dirty="0"/>
+          </a:p>
+          <a:p>
+            <a:pPr algn="ctr"/>
+            <a:endParaRPr lang="en-CA" sz="3200" dirty="0"/>
+          </a:p>
+          <a:p>
+            <a:pPr algn="ctr"/>
+            <a:endParaRPr lang="en-CA" sz="3200" dirty="0"/>
+          </a:p>
+          <a:p>
+            <a:pPr algn="ctr"/>
+            <a:endParaRPr lang="en-CA" sz="3200" dirty="0"/>
+          </a:p>
+          <a:p>
+            <a:pPr algn="ctr"/>
+            <a:endParaRPr lang="en-CA" sz="3200" dirty="0"/>
+          </a:p>
+          <a:p>
+            <a:pPr algn="ctr"/>
+            <a:endParaRPr lang="en-CA" sz="3200" dirty="0"/>
+          </a:p>
+          <a:p>
+            <a:pPr algn="ctr"/>
+            <a:endParaRPr lang="en-CA" sz="3200" dirty="0"/>
+          </a:p>
+        </p:txBody>
+      </p:sp>
+      <p:sp>
+        <p:nvSpPr>
+          <p:cNvPr id="5" name="Arrow: Left 4">
+            <a:extLst>
+              <a:ext uri="{FF2B5EF4-FFF2-40B4-BE49-F238E27FC236}">
+                <a16:creationId xmlns:a16="http://schemas.microsoft.com/office/drawing/2014/main" id="{39232E8F-C7AD-4C86-81B6-ED31F3D809AC}"/>
+              </a:ext>
+            </a:extLst>
+          </p:cNvPr>
+          <p:cNvSpPr/>
+          <p:nvPr/>
+        </p:nvSpPr>
+        <p:spPr>
+          <a:xfrm rot="10800000">
+            <a:off x="5629275" y="1609725"/>
+            <a:ext cx="933450" cy="685800"/>
+          </a:xfrm>
+          <a:prstGeom prst="leftArrow">
+            <a:avLst/>
+          </a:prstGeom>
+          <a:solidFill>
+            <a:srgbClr val="7030A0"/>
+          </a:solidFill>
+        </p:spPr>
+        <p:style>
+          <a:lnRef idx="2">
+            <a:schemeClr val="accent1">
+              <a:shade val="50000"/>
+            </a:schemeClr>
+          </a:lnRef>
+          <a:fillRef idx="1">
+            <a:schemeClr val="accent1"/>
+          </a:fillRef>
+          <a:effectRef idx="0">
+            <a:schemeClr val="accent1"/>
+          </a:effectRef>
+          <a:fontRef idx="minor">
+            <a:schemeClr val="lt1"/>
+          </a:fontRef>
+        </p:style>
+        <p:txBody>
+          <a:bodyPr rtlCol="0" anchor="ctr"/>
+          <a:lstStyle/>
+          <a:p>
+            <a:pPr algn="ctr"/>
+            <a:endParaRPr lang="en-CA"/>
+          </a:p>
+        </p:txBody>
+      </p:sp>
+    </p:spTree>
+    <p:extLst>
+      <p:ext uri="{BB962C8B-B14F-4D97-AF65-F5344CB8AC3E}">
+        <p14:creationId xmlns:p14="http://schemas.microsoft.com/office/powerpoint/2010/main" val="977469115"/>
+      </p:ext>
+    </p:extLst>
+  </p:cSld>
+  <p:clrMapOvr>
+    <a:masterClrMapping/>
+  </p:clrMapOvr>
+</p:sld>
+</file>
+
+<file path=ppt/slides/slide5.xml><?xml version="1.0" encoding="utf-8"?>
+<p:sld xmlns:a="http://schemas.openxmlformats.org/drawingml/2006/main" xmlns:r="http://schemas.openxmlformats.org/officeDocument/2006/relationships" xmlns:p="http://schemas.openxmlformats.org/presentationml/2006/main">
+  <p:cSld>
+    <p:spTree>
+      <p:nvGrpSpPr>
+        <p:cNvPr id="1" name=""/>
+        <p:cNvGrpSpPr/>
+        <p:nvPr/>
+      </p:nvGrpSpPr>
+      <p:grpSpPr>
+        <a:xfrm>
+          <a:off x="0" y="0"/>
+          <a:ext cx="0" cy="0"/>
+          <a:chOff x="0" y="0"/>
+          <a:chExt cx="0" cy="0"/>
+        </a:xfrm>
+      </p:grpSpPr>
+      <p:sp>
+        <p:nvSpPr>
+          <p:cNvPr id="2" name="Rectangle 1">
+            <a:extLst>
+              <a:ext uri="{FF2B5EF4-FFF2-40B4-BE49-F238E27FC236}">
+                <a16:creationId xmlns:a16="http://schemas.microsoft.com/office/drawing/2014/main" id="{E144D0AD-26F3-4D39-B24D-AF176C8729BF}"/>
+              </a:ext>
+            </a:extLst>
+          </p:cNvPr>
+          <p:cNvSpPr/>
+          <p:nvPr/>
+        </p:nvSpPr>
+        <p:spPr>
+          <a:xfrm>
+            <a:off x="504823" y="581024"/>
+            <a:ext cx="4391025" cy="5133975"/>
+          </a:xfrm>
+          <a:prstGeom prst="rect">
+            <a:avLst/>
+          </a:prstGeom>
+        </p:spPr>
+        <p:style>
+          <a:lnRef idx="2">
+            <a:schemeClr val="accent1">
+              <a:shade val="50000"/>
+            </a:schemeClr>
+          </a:lnRef>
+          <a:fillRef idx="1">
+            <a:schemeClr val="accent1"/>
+          </a:fillRef>
+          <a:effectRef idx="0">
+            <a:schemeClr val="accent1"/>
+          </a:effectRef>
+          <a:fontRef idx="minor">
+            <a:schemeClr val="lt1"/>
+          </a:fontRef>
+        </p:style>
+        <p:txBody>
+          <a:bodyPr rtlCol="0" anchor="ctr"/>
+          <a:lstStyle/>
+          <a:p>
+            <a:r>
+              <a:rPr lang="en-CA" sz="1800" dirty="0">
+                <a:solidFill>
+                  <a:srgbClr val="000000"/>
+                </a:solidFill>
+                <a:latin typeface="Consolas" panose="020B0609020204030204" pitchFamily="49" charset="0"/>
+              </a:rPr>
+              <a:t>Main</a:t>
+            </a:r>
+          </a:p>
+          <a:p>
+            <a:r>
+              <a:rPr lang="en-CA" dirty="0">
+                <a:solidFill>
+                  <a:srgbClr val="000000"/>
+                </a:solidFill>
+                <a:latin typeface="Consolas" panose="020B0609020204030204" pitchFamily="49" charset="0"/>
+              </a:rPr>
+              <a:t>Int </a:t>
+            </a:r>
+            <a:r>
+              <a:rPr lang="en-CA" dirty="0" err="1">
+                <a:solidFill>
+                  <a:srgbClr val="000000"/>
+                </a:solidFill>
+                <a:latin typeface="Consolas" panose="020B0609020204030204" pitchFamily="49" charset="0"/>
+              </a:rPr>
+              <a:t>myArray</a:t>
+            </a:r>
+            <a:r>
+              <a:rPr lang="en-CA" dirty="0">
+                <a:solidFill>
+                  <a:srgbClr val="000000"/>
+                </a:solidFill>
+                <a:latin typeface="Consolas" panose="020B0609020204030204" pitchFamily="49" charset="0"/>
+              </a:rPr>
+              <a:t>[1000];</a:t>
+            </a:r>
+            <a:endParaRPr lang="en-CA" sz="1800" dirty="0">
+              <a:solidFill>
+                <a:srgbClr val="000000"/>
+              </a:solidFill>
+              <a:latin typeface="Consolas" panose="020B0609020204030204" pitchFamily="49" charset="0"/>
+            </a:endParaRPr>
+          </a:p>
+          <a:p>
+            <a:r>
+              <a:rPr lang="en-CA" sz="1800" dirty="0">
+                <a:solidFill>
+                  <a:srgbClr val="000000"/>
+                </a:solidFill>
+                <a:latin typeface="Consolas" panose="020B0609020204030204" pitchFamily="49" charset="0"/>
+              </a:rPr>
+              <a:t>89: func2( </a:t>
+            </a:r>
+            <a:r>
+              <a:rPr lang="en-CA" sz="1800" dirty="0">
+                <a:solidFill>
+                  <a:srgbClr val="A31515"/>
+                </a:solidFill>
+                <a:latin typeface="Consolas" panose="020B0609020204030204" pitchFamily="49" charset="0"/>
+              </a:rPr>
+              <a:t>"Michael"</a:t>
+            </a:r>
+            <a:r>
+              <a:rPr lang="en-CA" sz="1800" dirty="0">
+                <a:solidFill>
+                  <a:srgbClr val="000000"/>
+                </a:solidFill>
+                <a:latin typeface="Consolas" panose="020B0609020204030204" pitchFamily="49" charset="0"/>
+              </a:rPr>
+              <a:t>, 7);</a:t>
+            </a:r>
+          </a:p>
+          <a:p>
+            <a:endParaRPr lang="en-CA" dirty="0"/>
+          </a:p>
+          <a:p>
+            <a:r>
+              <a:rPr lang="en-CA" dirty="0"/>
+              <a:t>______________</a:t>
+            </a:r>
+          </a:p>
+          <a:p>
+            <a:r>
+              <a:rPr lang="en-US" dirty="0"/>
+              <a:t>827: void func2(std::string b, int c)</a:t>
+            </a:r>
+          </a:p>
+          <a:p>
+            <a:r>
+              <a:rPr lang="en-US" dirty="0"/>
+              <a:t>	func1(c, (float)c);</a:t>
+            </a:r>
+          </a:p>
+          <a:p>
+            <a:endParaRPr lang="en-US" dirty="0"/>
+          </a:p>
+          <a:p>
+            <a:r>
+              <a:rPr lang="en-US" dirty="0"/>
+              <a:t>______________</a:t>
+            </a:r>
+          </a:p>
+          <a:p>
+            <a:r>
+              <a:rPr lang="en-US" dirty="0"/>
+              <a:t>8173: void func1(int x, float y)</a:t>
+            </a:r>
+          </a:p>
+          <a:p>
+            <a:r>
+              <a:rPr lang="en-US" dirty="0"/>
+              <a:t>	std::</a:t>
+            </a:r>
+            <a:r>
+              <a:rPr lang="en-US" dirty="0" err="1"/>
+              <a:t>cout</a:t>
+            </a:r>
+            <a:r>
+              <a:rPr lang="en-US" dirty="0"/>
+              <a:t> &lt;&lt; x &lt;&lt; y;</a:t>
+            </a:r>
+          </a:p>
+          <a:p>
+            <a:r>
+              <a:rPr lang="en-US" dirty="0"/>
+              <a:t>________</a:t>
+            </a:r>
+          </a:p>
+          <a:p>
+            <a:r>
+              <a:rPr lang="en-US" dirty="0" err="1"/>
+              <a:t>Cout</a:t>
+            </a:r>
+            <a:r>
+              <a:rPr lang="en-US" dirty="0"/>
+              <a:t> </a:t>
+            </a:r>
+            <a:endParaRPr lang="en-CA" dirty="0"/>
+          </a:p>
+        </p:txBody>
+      </p:sp>
+      <p:sp>
+        <p:nvSpPr>
+          <p:cNvPr id="3" name="Arrow: Left 2">
+            <a:extLst>
+              <a:ext uri="{FF2B5EF4-FFF2-40B4-BE49-F238E27FC236}">
+                <a16:creationId xmlns:a16="http://schemas.microsoft.com/office/drawing/2014/main" id="{0E843B16-37ED-460E-A2ED-E9064FB8FDE9}"/>
+              </a:ext>
+            </a:extLst>
+          </p:cNvPr>
+          <p:cNvSpPr/>
+          <p:nvPr/>
+        </p:nvSpPr>
+        <p:spPr>
+          <a:xfrm>
+            <a:off x="3910013" y="1400173"/>
+            <a:ext cx="933450" cy="685800"/>
+          </a:xfrm>
+          <a:prstGeom prst="leftArrow">
+            <a:avLst/>
+          </a:prstGeom>
+          <a:solidFill>
+            <a:srgbClr val="7030A0"/>
+          </a:solidFill>
+        </p:spPr>
+        <p:style>
+          <a:lnRef idx="2">
+            <a:schemeClr val="accent1">
+              <a:shade val="50000"/>
+            </a:schemeClr>
+          </a:lnRef>
+          <a:fillRef idx="1">
+            <a:schemeClr val="accent1"/>
+          </a:fillRef>
+          <a:effectRef idx="0">
+            <a:schemeClr val="accent1"/>
+          </a:effectRef>
+          <a:fontRef idx="minor">
+            <a:schemeClr val="lt1"/>
+          </a:fontRef>
+        </p:style>
+        <p:txBody>
+          <a:bodyPr rtlCol="0" anchor="ctr"/>
+          <a:lstStyle/>
+          <a:p>
+            <a:pPr algn="ctr"/>
+            <a:endParaRPr lang="en-CA" dirty="0"/>
+          </a:p>
+        </p:txBody>
+      </p:sp>
+      <p:sp>
+        <p:nvSpPr>
+          <p:cNvPr id="5" name="Arrow: Left 4">
+            <a:extLst>
+              <a:ext uri="{FF2B5EF4-FFF2-40B4-BE49-F238E27FC236}">
+                <a16:creationId xmlns:a16="http://schemas.microsoft.com/office/drawing/2014/main" id="{39232E8F-C7AD-4C86-81B6-ED31F3D809AC}"/>
+              </a:ext>
+            </a:extLst>
+          </p:cNvPr>
+          <p:cNvSpPr/>
+          <p:nvPr/>
+        </p:nvSpPr>
+        <p:spPr>
+          <a:xfrm rot="10800000">
+            <a:off x="5700715" y="1485452"/>
+            <a:ext cx="933450" cy="685800"/>
+          </a:xfrm>
+          <a:prstGeom prst="leftArrow">
+            <a:avLst/>
+          </a:prstGeom>
+          <a:solidFill>
+            <a:srgbClr val="7030A0"/>
+          </a:solidFill>
+        </p:spPr>
+        <p:style>
+          <a:lnRef idx="2">
+            <a:schemeClr val="accent1">
+              <a:shade val="50000"/>
+            </a:schemeClr>
+          </a:lnRef>
+          <a:fillRef idx="1">
+            <a:schemeClr val="accent1"/>
+          </a:fillRef>
+          <a:effectRef idx="0">
+            <a:schemeClr val="accent1"/>
+          </a:effectRef>
+          <a:fontRef idx="minor">
+            <a:schemeClr val="lt1"/>
+          </a:fontRef>
+        </p:style>
+        <p:txBody>
+          <a:bodyPr rtlCol="0" anchor="ctr"/>
+          <a:lstStyle/>
+          <a:p>
+            <a:pPr algn="ctr"/>
+            <a:endParaRPr lang="en-CA"/>
+          </a:p>
+        </p:txBody>
+      </p:sp>
+      <p:sp>
+        <p:nvSpPr>
+          <p:cNvPr id="6" name="TextBox 5">
+            <a:extLst>
+              <a:ext uri="{FF2B5EF4-FFF2-40B4-BE49-F238E27FC236}">
+                <a16:creationId xmlns:a16="http://schemas.microsoft.com/office/drawing/2014/main" id="{66543C1B-4CA5-4D23-93C3-5B39DC40B0DF}"/>
+              </a:ext>
+            </a:extLst>
+          </p:cNvPr>
+          <p:cNvSpPr txBox="1"/>
+          <p:nvPr/>
+        </p:nvSpPr>
+        <p:spPr>
+          <a:xfrm>
+            <a:off x="6219825" y="856357"/>
+            <a:ext cx="3876674" cy="5632311"/>
+          </a:xfrm>
+          <a:prstGeom prst="rect">
+            <a:avLst/>
+          </a:prstGeom>
+          <a:noFill/>
+        </p:spPr>
+        <p:txBody>
+          <a:bodyPr wrap="square" rtlCol="0">
+            <a:spAutoFit/>
+          </a:bodyPr>
+          <a:lstStyle/>
+          <a:p>
+            <a:pPr algn="ctr"/>
+            <a:r>
+              <a:rPr lang="en-US" sz="2400" dirty="0"/>
+              <a:t>Stack:</a:t>
+            </a:r>
+          </a:p>
+          <a:p>
+            <a:pPr algn="ctr"/>
+            <a:r>
+              <a:rPr lang="en-US" sz="2400" dirty="0"/>
+              <a:t>__________</a:t>
+            </a:r>
+          </a:p>
+          <a:p>
+            <a:pPr algn="ctr"/>
+            <a:r>
+              <a:rPr lang="en-US" sz="2400" dirty="0" err="1"/>
+              <a:t>myVector</a:t>
+            </a:r>
+            <a:endParaRPr lang="en-US" sz="2400" dirty="0"/>
+          </a:p>
+          <a:p>
+            <a:pPr algn="ctr"/>
+            <a:endParaRPr lang="en-US" sz="2400" dirty="0"/>
+          </a:p>
+          <a:p>
+            <a:pPr algn="ctr"/>
+            <a:r>
+              <a:rPr lang="en-US" sz="2400" dirty="0"/>
+              <a:t>_____78987_______</a:t>
+            </a:r>
+          </a:p>
+          <a:p>
+            <a:pPr algn="ctr"/>
+            <a:r>
+              <a:rPr lang="en-US" sz="2400" dirty="0"/>
+              <a:t>7</a:t>
+            </a:r>
+          </a:p>
+          <a:p>
+            <a:pPr algn="ctr"/>
+            <a:r>
+              <a:rPr lang="en-US" sz="2400" dirty="0"/>
+              <a:t>7.0</a:t>
+            </a:r>
+          </a:p>
+          <a:p>
+            <a:pPr algn="ctr"/>
+            <a:r>
+              <a:rPr lang="en-US" sz="2400" dirty="0"/>
+              <a:t>p</a:t>
+            </a:r>
+          </a:p>
+          <a:p>
+            <a:pPr algn="ctr"/>
+            <a:r>
+              <a:rPr lang="en-CA" sz="2400" dirty="0"/>
+              <a:t>_________________</a:t>
+            </a:r>
+          </a:p>
+          <a:p>
+            <a:pPr algn="ctr"/>
+            <a:endParaRPr lang="en-CA" sz="2400" dirty="0"/>
+          </a:p>
+          <a:p>
+            <a:pPr algn="ctr"/>
+            <a:endParaRPr lang="en-CA" sz="2400" dirty="0"/>
+          </a:p>
+          <a:p>
+            <a:pPr algn="ctr"/>
+            <a:endParaRPr lang="en-CA" sz="2400" dirty="0"/>
+          </a:p>
+          <a:p>
+            <a:pPr algn="ctr"/>
+            <a:endParaRPr lang="en-CA" sz="2400" dirty="0"/>
+          </a:p>
+          <a:p>
+            <a:pPr algn="ctr"/>
+            <a:endParaRPr lang="en-CA" sz="2400" dirty="0"/>
+          </a:p>
+          <a:p>
+            <a:pPr algn="ctr"/>
+            <a:endParaRPr lang="en-CA" sz="2400" dirty="0"/>
+          </a:p>
+        </p:txBody>
+      </p:sp>
+      <p:cxnSp>
+        <p:nvCxnSpPr>
+          <p:cNvPr id="11" name="Straight Arrow Connector 10">
+            <a:extLst>
+              <a:ext uri="{FF2B5EF4-FFF2-40B4-BE49-F238E27FC236}">
+                <a16:creationId xmlns:a16="http://schemas.microsoft.com/office/drawing/2014/main" id="{73371ED5-067B-46ED-98F8-CA9A69E9F809}"/>
+              </a:ext>
+            </a:extLst>
+          </p:cNvPr>
+          <p:cNvCxnSpPr>
+            <a:cxnSpLocks/>
+          </p:cNvCxnSpPr>
+          <p:nvPr/>
+        </p:nvCxnSpPr>
+        <p:spPr>
+          <a:xfrm>
+            <a:off x="3352800" y="2705101"/>
+            <a:ext cx="4533902" cy="967411"/>
+          </a:xfrm>
+          <a:prstGeom prst="straightConnector1">
+            <a:avLst/>
+          </a:prstGeom>
+          <a:ln>
+            <a:tailEnd type="triangle"/>
+          </a:ln>
+        </p:spPr>
+        <p:style>
+          <a:lnRef idx="3">
+            <a:schemeClr val="accent2"/>
+          </a:lnRef>
+          <a:fillRef idx="0">
+            <a:schemeClr val="accent2"/>
+          </a:fillRef>
+          <a:effectRef idx="2">
+            <a:schemeClr val="accent2"/>
+          </a:effectRef>
+          <a:fontRef idx="minor">
+            <a:schemeClr val="tx1"/>
+          </a:fontRef>
+        </p:style>
+      </p:cxnSp>
+    </p:spTree>
+    <p:extLst>
+      <p:ext uri="{BB962C8B-B14F-4D97-AF65-F5344CB8AC3E}">
+        <p14:creationId xmlns:p14="http://schemas.microsoft.com/office/powerpoint/2010/main" val="2670216523"/>
+      </p:ext>
+    </p:extLst>
+  </p:cSld>
+  <p:clrMapOvr>
+    <a:masterClrMapping/>
+  </p:clrMapOvr>
+</p:sld>
+</file>
+
+<file path=ppt/slides/slide6.xml><?xml version="1.0" encoding="utf-8"?>
+<p:sld xmlns:a="http://schemas.openxmlformats.org/drawingml/2006/main" xmlns:r="http://schemas.openxmlformats.org/officeDocument/2006/relationships" xmlns:p="http://schemas.openxmlformats.org/presentationml/2006/main">
+  <p:cSld>
+    <p:spTree>
+      <p:nvGrpSpPr>
+        <p:cNvPr id="1" name=""/>
+        <p:cNvGrpSpPr/>
+        <p:nvPr/>
+      </p:nvGrpSpPr>
+      <p:grpSpPr>
+        <a:xfrm>
+          <a:off x="0" y="0"/>
+          <a:ext cx="0" cy="0"/>
+          <a:chOff x="0" y="0"/>
+          <a:chExt cx="0" cy="0"/>
+        </a:xfrm>
+      </p:grpSpPr>
+      <p:sp>
+        <p:nvSpPr>
+          <p:cNvPr id="2" name="Rectangle 1">
+            <a:extLst>
+              <a:ext uri="{FF2B5EF4-FFF2-40B4-BE49-F238E27FC236}">
+                <a16:creationId xmlns:a16="http://schemas.microsoft.com/office/drawing/2014/main" id="{E144D0AD-26F3-4D39-B24D-AF176C8729BF}"/>
+              </a:ext>
+            </a:extLst>
+          </p:cNvPr>
+          <p:cNvSpPr/>
+          <p:nvPr/>
+        </p:nvSpPr>
+        <p:spPr>
+          <a:xfrm>
+            <a:off x="504823" y="581024"/>
+            <a:ext cx="4391025" cy="5133975"/>
+          </a:xfrm>
+          <a:prstGeom prst="rect">
+            <a:avLst/>
+          </a:prstGeom>
+        </p:spPr>
+        <p:style>
+          <a:lnRef idx="2">
+            <a:schemeClr val="accent1">
+              <a:shade val="50000"/>
+            </a:schemeClr>
+          </a:lnRef>
+          <a:fillRef idx="1">
+            <a:schemeClr val="accent1"/>
+          </a:fillRef>
+          <a:effectRef idx="0">
+            <a:schemeClr val="accent1"/>
+          </a:effectRef>
+          <a:fontRef idx="minor">
+            <a:schemeClr val="lt1"/>
+          </a:fontRef>
+        </p:style>
+        <p:txBody>
+          <a:bodyPr rtlCol="0" anchor="ctr"/>
+          <a:lstStyle/>
+          <a:p>
+            <a:r>
+              <a:rPr lang="en-CA" sz="1800" dirty="0">
+                <a:solidFill>
+                  <a:srgbClr val="000000"/>
+                </a:solidFill>
+                <a:latin typeface="Consolas" panose="020B0609020204030204" pitchFamily="49" charset="0"/>
+              </a:rPr>
+              <a:t>Main</a:t>
+            </a:r>
+          </a:p>
+          <a:p>
+            <a:r>
+              <a:rPr lang="en-CA" dirty="0">
+                <a:solidFill>
+                  <a:srgbClr val="000000"/>
+                </a:solidFill>
+                <a:latin typeface="Consolas" panose="020B0609020204030204" pitchFamily="49" charset="0"/>
+              </a:rPr>
+              <a:t>Int </a:t>
+            </a:r>
+            <a:r>
+              <a:rPr lang="en-CA" dirty="0" err="1">
+                <a:solidFill>
+                  <a:srgbClr val="000000"/>
+                </a:solidFill>
+                <a:latin typeface="Consolas" panose="020B0609020204030204" pitchFamily="49" charset="0"/>
+              </a:rPr>
+              <a:t>myArray</a:t>
+            </a:r>
+            <a:r>
+              <a:rPr lang="en-CA" dirty="0">
+                <a:solidFill>
+                  <a:srgbClr val="000000"/>
+                </a:solidFill>
+                <a:latin typeface="Consolas" panose="020B0609020204030204" pitchFamily="49" charset="0"/>
+              </a:rPr>
+              <a:t>[1000];</a:t>
+            </a:r>
+            <a:endParaRPr lang="en-CA" sz="1800" dirty="0">
+              <a:solidFill>
+                <a:srgbClr val="000000"/>
+              </a:solidFill>
+              <a:latin typeface="Consolas" panose="020B0609020204030204" pitchFamily="49" charset="0"/>
+            </a:endParaRPr>
+          </a:p>
+          <a:p>
+            <a:r>
+              <a:rPr lang="en-CA" sz="1800" dirty="0">
+                <a:solidFill>
+                  <a:srgbClr val="000000"/>
+                </a:solidFill>
+                <a:latin typeface="Consolas" panose="020B0609020204030204" pitchFamily="49" charset="0"/>
+              </a:rPr>
+              <a:t>89: func2( </a:t>
+            </a:r>
+            <a:r>
+              <a:rPr lang="en-CA" sz="1800" dirty="0">
+                <a:solidFill>
+                  <a:srgbClr val="A31515"/>
+                </a:solidFill>
+                <a:latin typeface="Consolas" panose="020B0609020204030204" pitchFamily="49" charset="0"/>
+              </a:rPr>
+              <a:t>"Michael"</a:t>
+            </a:r>
+            <a:r>
+              <a:rPr lang="en-CA" sz="1800" dirty="0">
+                <a:solidFill>
+                  <a:srgbClr val="000000"/>
+                </a:solidFill>
+                <a:latin typeface="Consolas" panose="020B0609020204030204" pitchFamily="49" charset="0"/>
+              </a:rPr>
+              <a:t>, 7);</a:t>
+            </a:r>
+          </a:p>
+          <a:p>
+            <a:r>
+              <a:rPr lang="en-CA" dirty="0">
+                <a:solidFill>
+                  <a:srgbClr val="000000"/>
+                </a:solidFill>
+                <a:latin typeface="Consolas" panose="020B0609020204030204" pitchFamily="49" charset="0"/>
+              </a:rPr>
+              <a:t>89: func3(</a:t>
+            </a:r>
+            <a:r>
+              <a:rPr lang="en-CA" dirty="0" err="1">
+                <a:solidFill>
+                  <a:srgbClr val="000000"/>
+                </a:solidFill>
+                <a:latin typeface="Consolas" panose="020B0609020204030204" pitchFamily="49" charset="0"/>
+              </a:rPr>
+              <a:t>giantVector</a:t>
+            </a:r>
+            <a:r>
+              <a:rPr lang="en-CA" dirty="0">
+                <a:solidFill>
+                  <a:srgbClr val="000000"/>
+                </a:solidFill>
+                <a:latin typeface="Consolas" panose="020B0609020204030204" pitchFamily="49" charset="0"/>
+              </a:rPr>
+              <a:t>, 2.311);</a:t>
+            </a:r>
+            <a:endParaRPr lang="en-CA" dirty="0"/>
+          </a:p>
+          <a:p>
+            <a:endParaRPr lang="en-CA" dirty="0"/>
+          </a:p>
+          <a:p>
+            <a:r>
+              <a:rPr lang="en-CA" dirty="0"/>
+              <a:t>______________</a:t>
+            </a:r>
+          </a:p>
+          <a:p>
+            <a:r>
+              <a:rPr lang="en-US" dirty="0"/>
+              <a:t>827: void func2(std::string b, int c)</a:t>
+            </a:r>
+          </a:p>
+          <a:p>
+            <a:r>
+              <a:rPr lang="en-US" dirty="0"/>
+              <a:t>	func1(c, (float)c);</a:t>
+            </a:r>
+          </a:p>
+          <a:p>
+            <a:endParaRPr lang="en-US" dirty="0"/>
+          </a:p>
+          <a:p>
+            <a:r>
+              <a:rPr lang="en-US" dirty="0"/>
+              <a:t>______________</a:t>
+            </a:r>
+          </a:p>
+          <a:p>
+            <a:r>
+              <a:rPr lang="en-US" dirty="0"/>
+              <a:t>8173: void func1(int x, float y)</a:t>
+            </a:r>
+          </a:p>
+          <a:p>
+            <a:r>
+              <a:rPr lang="en-US" dirty="0"/>
+              <a:t>	std::</a:t>
+            </a:r>
+            <a:r>
+              <a:rPr lang="en-US" dirty="0" err="1"/>
+              <a:t>cout</a:t>
+            </a:r>
+            <a:r>
+              <a:rPr lang="en-US" dirty="0"/>
+              <a:t> &lt;&lt; x &lt;&lt; y;</a:t>
+            </a:r>
+          </a:p>
+          <a:p>
+            <a:r>
+              <a:rPr lang="en-US" dirty="0"/>
+              <a:t>________</a:t>
+            </a:r>
+          </a:p>
+          <a:p>
+            <a:r>
+              <a:rPr lang="en-US" dirty="0" err="1"/>
+              <a:t>Cout</a:t>
+            </a:r>
+            <a:r>
+              <a:rPr lang="en-US" dirty="0"/>
+              <a:t> </a:t>
+            </a:r>
+            <a:endParaRPr lang="en-CA" dirty="0"/>
+          </a:p>
+        </p:txBody>
+      </p:sp>
+      <p:sp>
+        <p:nvSpPr>
+          <p:cNvPr id="3" name="Arrow: Left 2">
+            <a:extLst>
+              <a:ext uri="{FF2B5EF4-FFF2-40B4-BE49-F238E27FC236}">
+                <a16:creationId xmlns:a16="http://schemas.microsoft.com/office/drawing/2014/main" id="{0E843B16-37ED-460E-A2ED-E9064FB8FDE9}"/>
+              </a:ext>
+            </a:extLst>
+          </p:cNvPr>
+          <p:cNvSpPr/>
+          <p:nvPr/>
+        </p:nvSpPr>
+        <p:spPr>
+          <a:xfrm>
+            <a:off x="3924298" y="2733671"/>
+            <a:ext cx="933450" cy="685800"/>
+          </a:xfrm>
+          <a:prstGeom prst="leftArrow">
+            <a:avLst/>
+          </a:prstGeom>
+          <a:solidFill>
+            <a:srgbClr val="7030A0"/>
+          </a:solidFill>
+        </p:spPr>
+        <p:style>
+          <a:lnRef idx="2">
+            <a:schemeClr val="accent1">
+              <a:shade val="50000"/>
+            </a:schemeClr>
+          </a:lnRef>
+          <a:fillRef idx="1">
+            <a:schemeClr val="accent1"/>
+          </a:fillRef>
+          <a:effectRef idx="0">
+            <a:schemeClr val="accent1"/>
+          </a:effectRef>
+          <a:fontRef idx="minor">
+            <a:schemeClr val="lt1"/>
+          </a:fontRef>
+        </p:style>
+        <p:txBody>
+          <a:bodyPr rtlCol="0" anchor="ctr"/>
+          <a:lstStyle/>
+          <a:p>
+            <a:pPr algn="ctr"/>
+            <a:endParaRPr lang="en-CA" dirty="0"/>
+          </a:p>
+        </p:txBody>
+      </p:sp>
+      <p:sp>
+        <p:nvSpPr>
+          <p:cNvPr id="5" name="Arrow: Left 4">
+            <a:extLst>
+              <a:ext uri="{FF2B5EF4-FFF2-40B4-BE49-F238E27FC236}">
+                <a16:creationId xmlns:a16="http://schemas.microsoft.com/office/drawing/2014/main" id="{39232E8F-C7AD-4C86-81B6-ED31F3D809AC}"/>
+              </a:ext>
+            </a:extLst>
+          </p:cNvPr>
+          <p:cNvSpPr/>
+          <p:nvPr/>
+        </p:nvSpPr>
+        <p:spPr>
+          <a:xfrm rot="10800000">
+            <a:off x="5162550" y="2987604"/>
+            <a:ext cx="933450" cy="685800"/>
+          </a:xfrm>
+          <a:prstGeom prst="leftArrow">
+            <a:avLst/>
+          </a:prstGeom>
+          <a:solidFill>
+            <a:srgbClr val="7030A0"/>
+          </a:solidFill>
+        </p:spPr>
+        <p:style>
+          <a:lnRef idx="2">
+            <a:schemeClr val="accent1">
+              <a:shade val="50000"/>
+            </a:schemeClr>
+          </a:lnRef>
+          <a:fillRef idx="1">
+            <a:schemeClr val="accent1"/>
+          </a:fillRef>
+          <a:effectRef idx="0">
+            <a:schemeClr val="accent1"/>
+          </a:effectRef>
+          <a:fontRef idx="minor">
+            <a:schemeClr val="lt1"/>
+          </a:fontRef>
+        </p:style>
+        <p:txBody>
+          <a:bodyPr rtlCol="0" anchor="ctr"/>
+          <a:lstStyle/>
+          <a:p>
+            <a:pPr algn="ctr"/>
+            <a:endParaRPr lang="en-CA"/>
+          </a:p>
+        </p:txBody>
+      </p:sp>
+      <p:sp>
+        <p:nvSpPr>
+          <p:cNvPr id="6" name="TextBox 5">
+            <a:extLst>
+              <a:ext uri="{FF2B5EF4-FFF2-40B4-BE49-F238E27FC236}">
+                <a16:creationId xmlns:a16="http://schemas.microsoft.com/office/drawing/2014/main" id="{66543C1B-4CA5-4D23-93C3-5B39DC40B0DF}"/>
+              </a:ext>
+            </a:extLst>
+          </p:cNvPr>
+          <p:cNvSpPr txBox="1"/>
+          <p:nvPr/>
+        </p:nvSpPr>
+        <p:spPr>
+          <a:xfrm>
+            <a:off x="5981701" y="581024"/>
+            <a:ext cx="3067050" cy="6001643"/>
+          </a:xfrm>
+          <a:prstGeom prst="rect">
+            <a:avLst/>
+          </a:prstGeom>
+          <a:noFill/>
+        </p:spPr>
+        <p:txBody>
+          <a:bodyPr wrap="square" rtlCol="0">
+            <a:spAutoFit/>
+          </a:bodyPr>
+          <a:lstStyle/>
+          <a:p>
+            <a:r>
+              <a:rPr lang="en-US" sz="2400" dirty="0"/>
+              <a:t>Stack:</a:t>
+            </a:r>
+          </a:p>
+          <a:p>
+            <a:r>
+              <a:rPr lang="en-US" sz="2400" dirty="0"/>
+              <a:t>__________</a:t>
+            </a:r>
+          </a:p>
+          <a:p>
+            <a:r>
+              <a:rPr lang="en-US" sz="2400" dirty="0"/>
+              <a:t>“Michael”</a:t>
+            </a:r>
+          </a:p>
+          <a:p>
+            <a:r>
+              <a:rPr lang="en-US" sz="2400" dirty="0"/>
+              <a:t>7</a:t>
+            </a:r>
+          </a:p>
+          <a:p>
+            <a:r>
+              <a:rPr lang="en-US" sz="2400" dirty="0" err="1"/>
+              <a:t>myString</a:t>
+            </a:r>
+            <a:endParaRPr lang="en-US" sz="2400" dirty="0"/>
+          </a:p>
+          <a:p>
+            <a:r>
+              <a:rPr lang="en-US" sz="2400" dirty="0"/>
+              <a:t>int* </a:t>
+            </a:r>
+            <a:r>
+              <a:rPr lang="en-US" sz="2400" dirty="0" err="1"/>
+              <a:t>pMyArray</a:t>
+            </a:r>
+            <a:endParaRPr lang="en-US" sz="2400" dirty="0"/>
+          </a:p>
+          <a:p>
+            <a:r>
+              <a:rPr lang="en-US" sz="2400" dirty="0"/>
+              <a:t>int* pMyArray2</a:t>
+            </a:r>
+          </a:p>
+          <a:p>
+            <a:r>
+              <a:rPr lang="en-US" sz="2400" dirty="0" err="1"/>
+              <a:t>myInt</a:t>
+            </a:r>
+            <a:endParaRPr lang="en-US" sz="2400" dirty="0"/>
+          </a:p>
+          <a:p>
+            <a:r>
+              <a:rPr lang="en-US" sz="2400" dirty="0"/>
+              <a:t>89 (return address)</a:t>
+            </a:r>
+          </a:p>
+          <a:p>
+            <a:endParaRPr lang="en-US" sz="2400" dirty="0"/>
+          </a:p>
+          <a:p>
+            <a:endParaRPr lang="en-CA" sz="2400" dirty="0"/>
+          </a:p>
+          <a:p>
+            <a:endParaRPr lang="en-CA" sz="2400" dirty="0"/>
+          </a:p>
+          <a:p>
+            <a:endParaRPr lang="en-CA" sz="2400" dirty="0"/>
+          </a:p>
+          <a:p>
+            <a:endParaRPr lang="en-CA" sz="2400" dirty="0"/>
+          </a:p>
+          <a:p>
+            <a:endParaRPr lang="en-CA" sz="2400" dirty="0"/>
+          </a:p>
+          <a:p>
+            <a:endParaRPr lang="en-CA" sz="2400" dirty="0"/>
+          </a:p>
+        </p:txBody>
+      </p:sp>
+      <p:sp>
+        <p:nvSpPr>
+          <p:cNvPr id="7" name="TextBox 6">
+            <a:extLst>
+              <a:ext uri="{FF2B5EF4-FFF2-40B4-BE49-F238E27FC236}">
+                <a16:creationId xmlns:a16="http://schemas.microsoft.com/office/drawing/2014/main" id="{72BC66CD-719E-49AF-9F9C-315B4886E40D}"/>
+              </a:ext>
+            </a:extLst>
+          </p:cNvPr>
+          <p:cNvSpPr txBox="1"/>
+          <p:nvPr/>
+        </p:nvSpPr>
+        <p:spPr>
+          <a:xfrm>
+            <a:off x="9172577" y="514348"/>
+            <a:ext cx="3067050" cy="8217634"/>
+          </a:xfrm>
+          <a:prstGeom prst="rect">
+            <a:avLst/>
+          </a:prstGeom>
+          <a:noFill/>
+        </p:spPr>
+        <p:txBody>
+          <a:bodyPr wrap="square" rtlCol="0">
+            <a:spAutoFit/>
+          </a:bodyPr>
+          <a:lstStyle/>
+          <a:p>
+            <a:r>
+              <a:rPr lang="en-US" sz="2400" dirty="0"/>
+              <a:t>HEAP:</a:t>
+            </a:r>
+          </a:p>
+          <a:p>
+            <a:endParaRPr lang="en-US" sz="2400" dirty="0"/>
+          </a:p>
+          <a:p>
+            <a:r>
+              <a:rPr lang="en-US" sz="2400" dirty="0">
+                <a:solidFill>
+                  <a:srgbClr val="FFFF00"/>
+                </a:solidFill>
+              </a:rPr>
+              <a:t>0</a:t>
+            </a:r>
+          </a:p>
+          <a:p>
+            <a:r>
+              <a:rPr lang="en-US" sz="2400" dirty="0">
+                <a:solidFill>
+                  <a:srgbClr val="FFFF00"/>
+                </a:solidFill>
+              </a:rPr>
+              <a:t>1</a:t>
+            </a:r>
+          </a:p>
+          <a:p>
+            <a:r>
+              <a:rPr lang="en-US" sz="2400" dirty="0">
+                <a:solidFill>
+                  <a:srgbClr val="FFFF00"/>
+                </a:solidFill>
+              </a:rPr>
+              <a:t>2</a:t>
+            </a:r>
+          </a:p>
+          <a:p>
+            <a:r>
+              <a:rPr lang="en-US" sz="2400" dirty="0">
+                <a:solidFill>
+                  <a:srgbClr val="FFFF00"/>
+                </a:solidFill>
+              </a:rPr>
+              <a:t>3</a:t>
+            </a:r>
+          </a:p>
+          <a:p>
+            <a:r>
+              <a:rPr lang="en-US" sz="2400" dirty="0">
+                <a:solidFill>
+                  <a:srgbClr val="FFFF00"/>
+                </a:solidFill>
+              </a:rPr>
+              <a:t>4</a:t>
+            </a:r>
+          </a:p>
+          <a:p>
+            <a:r>
+              <a:rPr lang="en-US" sz="2400" dirty="0">
+                <a:solidFill>
+                  <a:srgbClr val="FFFF00"/>
+                </a:solidFill>
+              </a:rPr>
+              <a:t>5</a:t>
+            </a:r>
+          </a:p>
+          <a:p>
+            <a:r>
+              <a:rPr lang="en-US" sz="2400" dirty="0">
+                <a:solidFill>
+                  <a:srgbClr val="92D050"/>
+                </a:solidFill>
+              </a:rPr>
+              <a:t>0</a:t>
+            </a:r>
+          </a:p>
+          <a:p>
+            <a:r>
+              <a:rPr lang="en-US" sz="2400" dirty="0">
+                <a:solidFill>
+                  <a:srgbClr val="92D050"/>
+                </a:solidFill>
+              </a:rPr>
+              <a:t>1</a:t>
+            </a:r>
+          </a:p>
+          <a:p>
+            <a:r>
+              <a:rPr lang="en-US" sz="2400" dirty="0">
+                <a:solidFill>
+                  <a:srgbClr val="92D050"/>
+                </a:solidFill>
+              </a:rPr>
+              <a:t>2</a:t>
+            </a:r>
+          </a:p>
+          <a:p>
+            <a:r>
+              <a:rPr lang="en-US" sz="2400" dirty="0">
+                <a:solidFill>
+                  <a:srgbClr val="92D050"/>
+                </a:solidFill>
+              </a:rPr>
+              <a:t>3</a:t>
+            </a:r>
+          </a:p>
+          <a:p>
+            <a:r>
+              <a:rPr lang="en-US" sz="2400" dirty="0">
+                <a:solidFill>
+                  <a:srgbClr val="92D050"/>
+                </a:solidFill>
+              </a:rPr>
+              <a:t>4</a:t>
+            </a:r>
+          </a:p>
+          <a:p>
+            <a:r>
+              <a:rPr lang="en-US" sz="2400" dirty="0">
+                <a:solidFill>
+                  <a:srgbClr val="92D050"/>
+                </a:solidFill>
+              </a:rPr>
+              <a:t>5</a:t>
+            </a:r>
+          </a:p>
+          <a:p>
+            <a:endParaRPr lang="en-US" sz="2400" dirty="0"/>
+          </a:p>
+          <a:p>
+            <a:endParaRPr lang="en-US" sz="2400" dirty="0"/>
+          </a:p>
+          <a:p>
+            <a:endParaRPr lang="en-CA" sz="2400" dirty="0"/>
+          </a:p>
+          <a:p>
+            <a:endParaRPr lang="en-CA" sz="2400" dirty="0"/>
+          </a:p>
+          <a:p>
+            <a:endParaRPr lang="en-CA" sz="2400" dirty="0"/>
+          </a:p>
+          <a:p>
+            <a:endParaRPr lang="en-CA" sz="2400" dirty="0"/>
+          </a:p>
+          <a:p>
+            <a:endParaRPr lang="en-CA" sz="2400" dirty="0"/>
+          </a:p>
+          <a:p>
+            <a:endParaRPr lang="en-CA" sz="2400" dirty="0"/>
+          </a:p>
+        </p:txBody>
+      </p:sp>
+      <p:cxnSp>
+        <p:nvCxnSpPr>
+          <p:cNvPr id="9" name="Straight Arrow Connector 8">
+            <a:extLst>
+              <a:ext uri="{FF2B5EF4-FFF2-40B4-BE49-F238E27FC236}">
+                <a16:creationId xmlns:a16="http://schemas.microsoft.com/office/drawing/2014/main" id="{6038F833-E42A-4748-B51A-DC836836653E}"/>
+              </a:ext>
+            </a:extLst>
+          </p:cNvPr>
+          <p:cNvCxnSpPr/>
+          <p:nvPr/>
+        </p:nvCxnSpPr>
+        <p:spPr>
+          <a:xfrm flipV="1">
+            <a:off x="7924801" y="1514475"/>
+            <a:ext cx="1228727" cy="1142996"/>
+          </a:xfrm>
+          <a:prstGeom prst="straightConnector1">
+            <a:avLst/>
+          </a:prstGeom>
+          <a:ln w="63500">
+            <a:tailEnd type="triangle"/>
+          </a:ln>
+        </p:spPr>
+        <p:style>
+          <a:lnRef idx="1">
+            <a:schemeClr val="accent1"/>
+          </a:lnRef>
+          <a:fillRef idx="0">
+            <a:schemeClr val="accent1"/>
+          </a:fillRef>
+          <a:effectRef idx="0">
+            <a:schemeClr val="accent1"/>
+          </a:effectRef>
+          <a:fontRef idx="minor">
+            <a:schemeClr val="tx1"/>
+          </a:fontRef>
+        </p:style>
+      </p:cxnSp>
+      <p:cxnSp>
+        <p:nvCxnSpPr>
+          <p:cNvPr id="10" name="Straight Arrow Connector 9">
+            <a:extLst>
+              <a:ext uri="{FF2B5EF4-FFF2-40B4-BE49-F238E27FC236}">
+                <a16:creationId xmlns:a16="http://schemas.microsoft.com/office/drawing/2014/main" id="{A37D5680-C241-4967-BB57-68CC89E2183B}"/>
+              </a:ext>
+            </a:extLst>
+          </p:cNvPr>
+          <p:cNvCxnSpPr>
+            <a:cxnSpLocks/>
+          </p:cNvCxnSpPr>
+          <p:nvPr/>
+        </p:nvCxnSpPr>
+        <p:spPr>
+          <a:xfrm>
+            <a:off x="8077200" y="3076571"/>
+            <a:ext cx="1057277" cy="514351"/>
+          </a:xfrm>
+          <a:prstGeom prst="straightConnector1">
+            <a:avLst/>
+          </a:prstGeom>
+          <a:ln w="63500">
+            <a:tailEnd type="triangle"/>
+          </a:ln>
+        </p:spPr>
+        <p:style>
+          <a:lnRef idx="1">
+            <a:schemeClr val="accent1"/>
+          </a:lnRef>
+          <a:fillRef idx="0">
+            <a:schemeClr val="accent1"/>
+          </a:fillRef>
+          <a:effectRef idx="0">
+            <a:schemeClr val="accent1"/>
+          </a:effectRef>
+          <a:fontRef idx="minor">
+            <a:schemeClr val="tx1"/>
+          </a:fontRef>
+        </p:style>
+      </p:cxnSp>
+    </p:spTree>
+    <p:extLst>
+      <p:ext uri="{BB962C8B-B14F-4D97-AF65-F5344CB8AC3E}">
+        <p14:creationId xmlns:p14="http://schemas.microsoft.com/office/powerpoint/2010/main" val="795364501"/>
+      </p:ext>
+    </p:extLst>
+  </p:cSld>
+  <p:clrMapOvr>
+    <a:masterClrMapping/>
+  </p:clrMapOvr>
+</p:sld>
+</file>
+
+<file path=ppt/slides/slide7.xml><?xml version="1.0" encoding="utf-8"?>
+<p:sld xmlns:a="http://schemas.openxmlformats.org/drawingml/2006/main" xmlns:r="http://schemas.openxmlformats.org/officeDocument/2006/relationships" xmlns:p="http://schemas.openxmlformats.org/presentationml/2006/main">
+  <p:cSld>
+    <p:spTree>
+      <p:nvGrpSpPr>
+        <p:cNvPr id="1" name=""/>
+        <p:cNvGrpSpPr/>
+        <p:nvPr/>
+      </p:nvGrpSpPr>
+      <p:grpSpPr>
+        <a:xfrm>
+          <a:off x="0" y="0"/>
+          <a:ext cx="0" cy="0"/>
+          <a:chOff x="0" y="0"/>
+          <a:chExt cx="0" cy="0"/>
+        </a:xfrm>
+      </p:grpSpPr>
+      <p:sp>
+        <p:nvSpPr>
+          <p:cNvPr id="2" name="Rectangle: Rounded Corners 1">
+            <a:extLst>
+              <a:ext uri="{FF2B5EF4-FFF2-40B4-BE49-F238E27FC236}">
+                <a16:creationId xmlns:a16="http://schemas.microsoft.com/office/drawing/2014/main" id="{2ED3434D-F572-4CCD-87A9-A209BAA36878}"/>
+              </a:ext>
+            </a:extLst>
+          </p:cNvPr>
+          <p:cNvSpPr/>
+          <p:nvPr/>
+        </p:nvSpPr>
+        <p:spPr>
+          <a:xfrm>
+            <a:off x="428626" y="495300"/>
+            <a:ext cx="2438400" cy="1485900"/>
+          </a:xfrm>
+          <a:prstGeom prst="roundRect">
+            <a:avLst/>
+          </a:prstGeom>
+        </p:spPr>
+        <p:style>
+          <a:lnRef idx="2">
+            <a:schemeClr val="accent1">
+              <a:shade val="50000"/>
+            </a:schemeClr>
+          </a:lnRef>
+          <a:fillRef idx="1">
+            <a:schemeClr val="accent1"/>
+          </a:fillRef>
+          <a:effectRef idx="0">
+            <a:schemeClr val="accent1"/>
+          </a:effectRef>
+          <a:fontRef idx="minor">
+            <a:schemeClr val="lt1"/>
+          </a:fontRef>
+        </p:style>
+        <p:txBody>
+          <a:bodyPr rtlCol="0" anchor="ctr"/>
+          <a:lstStyle/>
+          <a:p>
+            <a:pPr algn="ctr"/>
+            <a:r>
+              <a:rPr lang="en-CA" dirty="0"/>
+              <a:t>CPU</a:t>
+            </a:r>
+          </a:p>
+          <a:p>
+            <a:pPr algn="ctr"/>
+            <a:r>
+              <a:rPr lang="en-CA" dirty="0"/>
+              <a:t>(registers)</a:t>
+            </a:r>
+          </a:p>
+        </p:txBody>
+      </p:sp>
+      <p:sp>
+        <p:nvSpPr>
+          <p:cNvPr id="3" name="Rectangle: Rounded Corners 2">
+            <a:extLst>
+              <a:ext uri="{FF2B5EF4-FFF2-40B4-BE49-F238E27FC236}">
+                <a16:creationId xmlns:a16="http://schemas.microsoft.com/office/drawing/2014/main" id="{D5BF9DD2-EB46-4A94-B9FA-85AFF6AF54FF}"/>
+              </a:ext>
+            </a:extLst>
+          </p:cNvPr>
+          <p:cNvSpPr/>
+          <p:nvPr/>
+        </p:nvSpPr>
+        <p:spPr>
+          <a:xfrm>
+            <a:off x="428626" y="2533650"/>
+            <a:ext cx="2438400" cy="1485900"/>
+          </a:xfrm>
+          <a:prstGeom prst="roundRect">
+            <a:avLst/>
+          </a:prstGeom>
+          <a:solidFill>
+            <a:srgbClr val="7030A0"/>
+          </a:solidFill>
+        </p:spPr>
+        <p:style>
+          <a:lnRef idx="2">
+            <a:schemeClr val="accent1">
+              <a:shade val="50000"/>
+            </a:schemeClr>
+          </a:lnRef>
+          <a:fillRef idx="1">
+            <a:schemeClr val="accent1"/>
+          </a:fillRef>
+          <a:effectRef idx="0">
+            <a:schemeClr val="accent1"/>
+          </a:effectRef>
+          <a:fontRef idx="minor">
+            <a:schemeClr val="lt1"/>
+          </a:fontRef>
+        </p:style>
+        <p:txBody>
+          <a:bodyPr rtlCol="0" anchor="ctr"/>
+          <a:lstStyle/>
+          <a:p>
+            <a:pPr algn="ctr"/>
+            <a:r>
+              <a:rPr lang="en-CA" dirty="0"/>
+              <a:t>Cache</a:t>
+            </a:r>
+          </a:p>
+        </p:txBody>
+      </p:sp>
+      <p:sp>
+        <p:nvSpPr>
+          <p:cNvPr id="7" name="Rectangle 6">
+            <a:extLst>
+              <a:ext uri="{FF2B5EF4-FFF2-40B4-BE49-F238E27FC236}">
+                <a16:creationId xmlns:a16="http://schemas.microsoft.com/office/drawing/2014/main" id="{2C0A4B6A-FFCD-4ACB-AF07-D337EBEACDCF}"/>
+              </a:ext>
+            </a:extLst>
+          </p:cNvPr>
+          <p:cNvSpPr/>
+          <p:nvPr/>
+        </p:nvSpPr>
+        <p:spPr>
+          <a:xfrm>
+            <a:off x="923926" y="3495674"/>
+            <a:ext cx="1447800" cy="314325"/>
+          </a:xfrm>
+          <a:prstGeom prst="rect">
+            <a:avLst/>
+          </a:prstGeom>
+          <a:solidFill>
+            <a:srgbClr val="FFFF00"/>
+          </a:solidFill>
+        </p:spPr>
+        <p:style>
+          <a:lnRef idx="2">
+            <a:schemeClr val="accent1">
+              <a:shade val="50000"/>
+            </a:schemeClr>
+          </a:lnRef>
+          <a:fillRef idx="1">
+            <a:schemeClr val="accent1"/>
+          </a:fillRef>
+          <a:effectRef idx="0">
+            <a:schemeClr val="accent1"/>
+          </a:effectRef>
+          <a:fontRef idx="minor">
+            <a:schemeClr val="lt1"/>
+          </a:fontRef>
+        </p:style>
+        <p:txBody>
+          <a:bodyPr rtlCol="0" anchor="ctr"/>
+          <a:lstStyle/>
+          <a:p>
+            <a:pPr algn="ctr"/>
+            <a:r>
+              <a:rPr lang="en-CA" dirty="0">
+                <a:solidFill>
+                  <a:schemeClr val="bg1"/>
+                </a:solidFill>
+              </a:rPr>
+              <a:t>Int x;</a:t>
+            </a:r>
+          </a:p>
+        </p:txBody>
+      </p:sp>
+      <p:sp>
+        <p:nvSpPr>
+          <p:cNvPr id="8" name="Rectangle 7">
+            <a:extLst>
+              <a:ext uri="{FF2B5EF4-FFF2-40B4-BE49-F238E27FC236}">
+                <a16:creationId xmlns:a16="http://schemas.microsoft.com/office/drawing/2014/main" id="{117A2555-390E-4B73-9CF6-8BBA883513F2}"/>
+              </a:ext>
+            </a:extLst>
+          </p:cNvPr>
+          <p:cNvSpPr/>
+          <p:nvPr/>
+        </p:nvSpPr>
+        <p:spPr>
+          <a:xfrm>
+            <a:off x="990601" y="1571624"/>
+            <a:ext cx="1447800" cy="314325"/>
+          </a:xfrm>
+          <a:prstGeom prst="rect">
+            <a:avLst/>
+          </a:prstGeom>
+          <a:solidFill>
+            <a:srgbClr val="FFFF00"/>
+          </a:solidFill>
+        </p:spPr>
+        <p:style>
+          <a:lnRef idx="2">
+            <a:schemeClr val="accent1">
+              <a:shade val="50000"/>
+            </a:schemeClr>
+          </a:lnRef>
+          <a:fillRef idx="1">
+            <a:schemeClr val="accent1"/>
+          </a:fillRef>
+          <a:effectRef idx="0">
+            <a:schemeClr val="accent1"/>
+          </a:effectRef>
+          <a:fontRef idx="minor">
+            <a:schemeClr val="lt1"/>
+          </a:fontRef>
+        </p:style>
+        <p:txBody>
+          <a:bodyPr rtlCol="0" anchor="ctr"/>
+          <a:lstStyle/>
+          <a:p>
+            <a:pPr algn="ctr"/>
+            <a:r>
+              <a:rPr lang="en-CA" dirty="0">
+                <a:solidFill>
+                  <a:schemeClr val="bg1"/>
+                </a:solidFill>
+              </a:rPr>
+              <a:t>Int x = 9;</a:t>
+            </a:r>
+          </a:p>
+        </p:txBody>
+      </p:sp>
+      <p:sp>
+        <p:nvSpPr>
+          <p:cNvPr id="9" name="Rectangle 8">
+            <a:extLst>
+              <a:ext uri="{FF2B5EF4-FFF2-40B4-BE49-F238E27FC236}">
+                <a16:creationId xmlns:a16="http://schemas.microsoft.com/office/drawing/2014/main" id="{BA9BE877-B1F8-40EE-9C9A-2D0484F71D3A}"/>
+              </a:ext>
+            </a:extLst>
+          </p:cNvPr>
+          <p:cNvSpPr/>
+          <p:nvPr/>
+        </p:nvSpPr>
+        <p:spPr>
+          <a:xfrm>
+            <a:off x="4386263" y="633413"/>
+            <a:ext cx="1447800" cy="314325"/>
+          </a:xfrm>
+          <a:prstGeom prst="rect">
+            <a:avLst/>
+          </a:prstGeom>
+          <a:solidFill>
+            <a:srgbClr val="FFFF00"/>
+          </a:solidFill>
+        </p:spPr>
+        <p:style>
+          <a:lnRef idx="2">
+            <a:schemeClr val="accent1">
+              <a:shade val="50000"/>
+            </a:schemeClr>
+          </a:lnRef>
+          <a:fillRef idx="1">
+            <a:schemeClr val="accent1"/>
+          </a:fillRef>
+          <a:effectRef idx="0">
+            <a:schemeClr val="accent1"/>
+          </a:effectRef>
+          <a:fontRef idx="minor">
+            <a:schemeClr val="lt1"/>
+          </a:fontRef>
+        </p:style>
+        <p:txBody>
+          <a:bodyPr rtlCol="0" anchor="ctr"/>
+          <a:lstStyle/>
+          <a:p>
+            <a:pPr algn="ctr"/>
+            <a:r>
+              <a:rPr lang="en-CA" dirty="0">
+                <a:solidFill>
+                  <a:schemeClr val="bg1"/>
+                </a:solidFill>
+              </a:rPr>
+              <a:t>Int x = 9;</a:t>
+            </a:r>
+          </a:p>
+        </p:txBody>
+      </p:sp>
+      <p:sp>
+        <p:nvSpPr>
+          <p:cNvPr id="11" name="Rectangle: Rounded Corners 10">
+            <a:extLst>
+              <a:ext uri="{FF2B5EF4-FFF2-40B4-BE49-F238E27FC236}">
+                <a16:creationId xmlns:a16="http://schemas.microsoft.com/office/drawing/2014/main" id="{476ED10B-851C-4C8A-937E-7DC70BB715F4}"/>
+              </a:ext>
+            </a:extLst>
+          </p:cNvPr>
+          <p:cNvSpPr/>
+          <p:nvPr/>
+        </p:nvSpPr>
+        <p:spPr>
+          <a:xfrm>
+            <a:off x="3581401" y="633412"/>
+            <a:ext cx="2933700" cy="5938837"/>
+          </a:xfrm>
+          <a:prstGeom prst="roundRect">
+            <a:avLst/>
+          </a:prstGeom>
+          <a:noFill/>
+        </p:spPr>
+        <p:style>
+          <a:lnRef idx="2">
+            <a:schemeClr val="accent6"/>
+          </a:lnRef>
+          <a:fillRef idx="1">
+            <a:schemeClr val="lt1"/>
+          </a:fillRef>
+          <a:effectRef idx="0">
+            <a:schemeClr val="accent6"/>
+          </a:effectRef>
+          <a:fontRef idx="minor">
+            <a:schemeClr val="dk1"/>
+          </a:fontRef>
+        </p:style>
+        <p:txBody>
+          <a:bodyPr rtlCol="0" anchor="ctr"/>
+          <a:lstStyle/>
+          <a:p>
+            <a:pPr algn="ctr"/>
+            <a:endParaRPr lang="en-CA"/>
+          </a:p>
+        </p:txBody>
+      </p:sp>
+      <p:sp>
+        <p:nvSpPr>
+          <p:cNvPr id="14" name="Rectangle: Rounded Corners 13">
+            <a:extLst>
+              <a:ext uri="{FF2B5EF4-FFF2-40B4-BE49-F238E27FC236}">
+                <a16:creationId xmlns:a16="http://schemas.microsoft.com/office/drawing/2014/main" id="{79829C42-279F-4625-A003-8433E2AF538D}"/>
+              </a:ext>
+            </a:extLst>
+          </p:cNvPr>
+          <p:cNvSpPr/>
+          <p:nvPr/>
+        </p:nvSpPr>
+        <p:spPr>
+          <a:xfrm>
+            <a:off x="6943725" y="561975"/>
+            <a:ext cx="4819649" cy="5938837"/>
+          </a:xfrm>
+          <a:prstGeom prst="roundRect">
+            <a:avLst/>
+          </a:prstGeom>
+        </p:spPr>
+        <p:style>
+          <a:lnRef idx="2">
+            <a:schemeClr val="accent1">
+              <a:shade val="50000"/>
+            </a:schemeClr>
+          </a:lnRef>
+          <a:fillRef idx="1">
+            <a:schemeClr val="accent1"/>
+          </a:fillRef>
+          <a:effectRef idx="0">
+            <a:schemeClr val="accent1"/>
+          </a:effectRef>
+          <a:fontRef idx="minor">
+            <a:schemeClr val="lt1"/>
+          </a:fontRef>
+        </p:style>
+        <p:txBody>
+          <a:bodyPr rtlCol="0" anchor="ctr"/>
+          <a:lstStyle/>
+          <a:p>
+            <a:pPr algn="ctr"/>
+            <a:r>
+              <a:rPr lang="en-CA" dirty="0"/>
+              <a:t>Hard drive (8 </a:t>
+            </a:r>
+            <a:r>
+              <a:rPr lang="en-CA" dirty="0" err="1"/>
+              <a:t>Tbytes</a:t>
+            </a:r>
+            <a:r>
+              <a:rPr lang="en-CA" dirty="0"/>
+              <a:t>)</a:t>
+            </a:r>
+          </a:p>
+        </p:txBody>
+      </p:sp>
+      <p:sp>
+        <p:nvSpPr>
+          <p:cNvPr id="15" name="Rectangle: Rounded Corners 14">
+            <a:extLst>
+              <a:ext uri="{FF2B5EF4-FFF2-40B4-BE49-F238E27FC236}">
+                <a16:creationId xmlns:a16="http://schemas.microsoft.com/office/drawing/2014/main" id="{BC1AFA77-D032-4E43-B067-2680CE361F0F}"/>
+              </a:ext>
+            </a:extLst>
+          </p:cNvPr>
+          <p:cNvSpPr/>
+          <p:nvPr/>
+        </p:nvSpPr>
+        <p:spPr>
+          <a:xfrm>
+            <a:off x="3712371" y="2482451"/>
+            <a:ext cx="2721769" cy="1426368"/>
+          </a:xfrm>
+          <a:prstGeom prst="roundRect">
+            <a:avLst/>
+          </a:prstGeom>
+          <a:noFill/>
+        </p:spPr>
+        <p:style>
+          <a:lnRef idx="2">
+            <a:schemeClr val="accent6"/>
+          </a:lnRef>
+          <a:fillRef idx="1">
+            <a:schemeClr val="lt1"/>
+          </a:fillRef>
+          <a:effectRef idx="0">
+            <a:schemeClr val="accent6"/>
+          </a:effectRef>
+          <a:fontRef idx="minor">
+            <a:schemeClr val="dk1"/>
+          </a:fontRef>
+        </p:style>
+        <p:txBody>
+          <a:bodyPr rtlCol="0" anchor="ctr"/>
+          <a:lstStyle/>
+          <a:p>
+            <a:pPr algn="ctr"/>
+            <a:endParaRPr lang="en-CA"/>
+          </a:p>
+        </p:txBody>
+      </p:sp>
+      <p:sp>
+        <p:nvSpPr>
+          <p:cNvPr id="16" name="Rectangle: Rounded Corners 15">
+            <a:extLst>
+              <a:ext uri="{FF2B5EF4-FFF2-40B4-BE49-F238E27FC236}">
+                <a16:creationId xmlns:a16="http://schemas.microsoft.com/office/drawing/2014/main" id="{12553D80-BE10-43CB-B46A-F09A2352CD77}"/>
+              </a:ext>
+            </a:extLst>
+          </p:cNvPr>
+          <p:cNvSpPr/>
+          <p:nvPr/>
+        </p:nvSpPr>
+        <p:spPr>
+          <a:xfrm>
+            <a:off x="7870031" y="1238250"/>
+            <a:ext cx="2721769" cy="1426368"/>
+          </a:xfrm>
+          <a:prstGeom prst="roundRect">
+            <a:avLst/>
+          </a:prstGeom>
+        </p:spPr>
+        <p:style>
+          <a:lnRef idx="2">
+            <a:schemeClr val="dk1">
+              <a:shade val="50000"/>
+            </a:schemeClr>
+          </a:lnRef>
+          <a:fillRef idx="1">
+            <a:schemeClr val="dk1"/>
+          </a:fillRef>
+          <a:effectRef idx="0">
+            <a:schemeClr val="dk1"/>
+          </a:effectRef>
+          <a:fontRef idx="minor">
+            <a:schemeClr val="lt1"/>
+          </a:fontRef>
+        </p:style>
+        <p:txBody>
+          <a:bodyPr rtlCol="0" anchor="ctr"/>
+          <a:lstStyle/>
+          <a:p>
+            <a:pPr algn="ctr"/>
+            <a:endParaRPr lang="en-CA"/>
+          </a:p>
+        </p:txBody>
+      </p:sp>
+      <p:sp>
+        <p:nvSpPr>
+          <p:cNvPr id="17" name="Rectangle: Rounded Corners 16">
+            <a:extLst>
+              <a:ext uri="{FF2B5EF4-FFF2-40B4-BE49-F238E27FC236}">
+                <a16:creationId xmlns:a16="http://schemas.microsoft.com/office/drawing/2014/main" id="{F050454B-0031-45C1-AB60-97E3E56A179B}"/>
+              </a:ext>
+            </a:extLst>
+          </p:cNvPr>
+          <p:cNvSpPr/>
+          <p:nvPr/>
+        </p:nvSpPr>
+        <p:spPr>
+          <a:xfrm>
+            <a:off x="8448675" y="1260874"/>
+            <a:ext cx="2600324" cy="1619249"/>
+          </a:xfrm>
+          <a:prstGeom prst="roundRect">
+            <a:avLst/>
+          </a:prstGeom>
+          <a:solidFill>
+            <a:srgbClr val="7030A0"/>
+          </a:solidFill>
+        </p:spPr>
+        <p:style>
+          <a:lnRef idx="2">
+            <a:schemeClr val="accent1">
+              <a:shade val="50000"/>
+            </a:schemeClr>
+          </a:lnRef>
+          <a:fillRef idx="1">
+            <a:schemeClr val="accent1"/>
+          </a:fillRef>
+          <a:effectRef idx="0">
+            <a:schemeClr val="accent1"/>
+          </a:effectRef>
+          <a:fontRef idx="minor">
+            <a:schemeClr val="lt1"/>
+          </a:fontRef>
+        </p:style>
+        <p:txBody>
+          <a:bodyPr rtlCol="0" anchor="ctr"/>
+          <a:lstStyle/>
+          <a:p>
+            <a:pPr algn="ctr"/>
+            <a:r>
+              <a:rPr lang="en-CA" dirty="0"/>
+              <a:t>RAM (64bit – 16 billion </a:t>
+            </a:r>
+            <a:r>
+              <a:rPr lang="en-CA" dirty="0" err="1"/>
+              <a:t>Gbytes</a:t>
+            </a:r>
+            <a:r>
+              <a:rPr lang="en-CA" dirty="0"/>
+              <a:t>)</a:t>
+            </a:r>
+          </a:p>
+          <a:p>
+            <a:pPr algn="ctr"/>
+            <a:endParaRPr lang="en-CA" dirty="0"/>
+          </a:p>
+        </p:txBody>
+      </p:sp>
+      <p:sp>
+        <p:nvSpPr>
+          <p:cNvPr id="18" name="Rectangle: Rounded Corners 17">
+            <a:extLst>
+              <a:ext uri="{FF2B5EF4-FFF2-40B4-BE49-F238E27FC236}">
+                <a16:creationId xmlns:a16="http://schemas.microsoft.com/office/drawing/2014/main" id="{2C43B0BF-DD84-41D9-BF24-47356F158826}"/>
+              </a:ext>
+            </a:extLst>
+          </p:cNvPr>
+          <p:cNvSpPr/>
+          <p:nvPr/>
+        </p:nvSpPr>
+        <p:spPr>
+          <a:xfrm>
+            <a:off x="3814768" y="790575"/>
+            <a:ext cx="2600324" cy="1619249"/>
+          </a:xfrm>
+          <a:prstGeom prst="roundRect">
+            <a:avLst/>
+          </a:prstGeom>
+          <a:solidFill>
+            <a:srgbClr val="7030A0"/>
+          </a:solidFill>
+        </p:spPr>
+        <p:style>
+          <a:lnRef idx="2">
+            <a:schemeClr val="accent1">
+              <a:shade val="50000"/>
+            </a:schemeClr>
+          </a:lnRef>
+          <a:fillRef idx="1">
+            <a:schemeClr val="accent1"/>
+          </a:fillRef>
+          <a:effectRef idx="0">
+            <a:schemeClr val="accent1"/>
+          </a:effectRef>
+          <a:fontRef idx="minor">
+            <a:schemeClr val="lt1"/>
+          </a:fontRef>
+        </p:style>
+        <p:txBody>
+          <a:bodyPr rtlCol="0" anchor="ctr"/>
+          <a:lstStyle/>
+          <a:p>
+            <a:pPr algn="ctr"/>
+            <a:r>
+              <a:rPr lang="en-CA" dirty="0"/>
+              <a:t>RAM (64bit – 16 billion </a:t>
+            </a:r>
+            <a:r>
+              <a:rPr lang="en-CA" dirty="0" err="1"/>
+              <a:t>Gbytes</a:t>
+            </a:r>
+            <a:r>
+              <a:rPr lang="en-CA" dirty="0"/>
+              <a:t>)</a:t>
+            </a:r>
+          </a:p>
+          <a:p>
+            <a:pPr algn="ctr"/>
+            <a:endParaRPr lang="en-CA" dirty="0"/>
+          </a:p>
+        </p:txBody>
+      </p:sp>
+    </p:spTree>
+    <p:extLst>
+      <p:ext uri="{BB962C8B-B14F-4D97-AF65-F5344CB8AC3E}">
+        <p14:creationId xmlns:p14="http://schemas.microsoft.com/office/powerpoint/2010/main" val="3626888835"/>
+      </p:ext>
+    </p:extLst>
+  </p:cSld>
+  <p:clrMapOvr>
+    <a:masterClrMapping/>
+  </p:clrMapOvr>
 </p:sld>
 </file>
 
@@ -3824,7 +6820,7 @@
   <a:extraClrSchemeLst/>
   <a:extLst>
     <a:ext uri="{05A4C25C-085E-4340-85A3-A5531E510DB2}">
-      <thm15:themeFamily xmlns:thm15="http://schemas.microsoft.com/office/thememl/2012/main" xmlns="" name="Office Theme" id="{62F939B6-93AF-4DB8-9C6B-D6C7DFDC589F}" vid="{4F46216B-77A9-411A-B9D3-5023FCB70208}"/>
+      <thm15:themeFamily xmlns:thm15="http://schemas.microsoft.com/office/thememl/2012/main" name="Office Theme" id="{62F939B6-93AF-4DB8-9C6B-D6C7DFDC589F}" vid="{4F46216B-77A9-411A-B9D3-5023FCB70208}"/>
     </a:ext>
   </a:extLst>
 </a:theme>

</xml_diff>